<commit_message>
Préparer le cours 4
</commit_message>
<xml_diff>
--- a/rel-electro-immersif-originals/ascii_seriel.pptx
+++ b/rel-electro-immersif-originals/ascii_seriel.pptx
@@ -5,12 +5,10 @@
     <p:sldMasterId id="2147483648" r:id="rId1"/>
   </p:sldMasterIdLst>
   <p:sldIdLst>
-    <p:sldId id="2928" r:id="rId2"/>
-    <p:sldId id="2929" r:id="rId3"/>
-    <p:sldId id="3072" r:id="rId4"/>
-    <p:sldId id="3073" r:id="rId5"/>
-    <p:sldId id="3074" r:id="rId6"/>
-    <p:sldId id="3075" r:id="rId7"/>
+    <p:sldId id="2929" r:id="rId2"/>
+    <p:sldId id="3073" r:id="rId3"/>
+    <p:sldId id="2928" r:id="rId4"/>
+    <p:sldId id="3072" r:id="rId5"/>
   </p:sldIdLst>
   <p:sldSz cx="12192000" cy="6858000"/>
   <p:notesSz cx="6858000" cy="9144000"/>
@@ -120,8 +118,7 @@
 <file path=ppt/revisionInfo.xml><?xml version="1.0" encoding="utf-8"?>
 <p1510:revInfo xmlns:a="http://schemas.openxmlformats.org/drawingml/2006/main" xmlns:r="http://schemas.openxmlformats.org/officeDocument/2006/relationships" xmlns:p1510="http://schemas.microsoft.com/office/powerpoint/2015/10/main">
   <p1510:revLst>
-    <p1510:client id="{39692FF9-9ACC-422A-B3B0-8FF286BCD43D}" v="1" dt="2022-09-12T20:03:59.244"/>
-    <p1510:client id="{BB0F71E6-F6EE-4C33-AB1B-410E07D32629}" v="3" dt="2022-09-12T20:28:28.051"/>
+    <p1510:client id="{BB0F71E6-F6EE-4C33-AB1B-410E07D32629}" v="5" dt="2022-09-13T22:46:43.697"/>
   </p1510:revLst>
 </p1510:revInfo>
 </file>
@@ -130,8 +127,8 @@
 <pc:chgInfo xmlns:a="http://schemas.openxmlformats.org/drawingml/2006/main" xmlns:r="http://schemas.openxmlformats.org/officeDocument/2006/relationships" xmlns:ac="http://schemas.microsoft.com/office/drawing/2013/main/command" xmlns:pc="http://schemas.microsoft.com/office/powerpoint/2013/main/command">
   <pc:docChgLst>
     <pc:chgData name="Thomas O Fredericks" userId="9a40f032a9b16fc7" providerId="LiveId" clId="{BB0F71E6-F6EE-4C33-AB1B-410E07D32629}"/>
-    <pc:docChg chg="addSld delSld modSld">
-      <pc:chgData name="Thomas O Fredericks" userId="9a40f032a9b16fc7" providerId="LiveId" clId="{BB0F71E6-F6EE-4C33-AB1B-410E07D32629}" dt="2022-09-12T20:28:28.051" v="3"/>
+    <pc:docChg chg="addSld delSld modSld sldOrd">
+      <pc:chgData name="Thomas O Fredericks" userId="9a40f032a9b16fc7" providerId="LiveId" clId="{BB0F71E6-F6EE-4C33-AB1B-410E07D32629}" dt="2022-09-13T22:46:43.696" v="7"/>
       <pc:docMkLst>
         <pc:docMk/>
       </pc:docMkLst>
@@ -142,8 +139,8 @@
           <pc:sldMk cId="1953261855" sldId="2928"/>
         </pc:sldMkLst>
       </pc:sldChg>
-      <pc:sldChg chg="add">
-        <pc:chgData name="Thomas O Fredericks" userId="9a40f032a9b16fc7" providerId="LiveId" clId="{BB0F71E6-F6EE-4C33-AB1B-410E07D32629}" dt="2022-09-12T20:27:19.478" v="2"/>
+      <pc:sldChg chg="add ord">
+        <pc:chgData name="Thomas O Fredericks" userId="9a40f032a9b16fc7" providerId="LiveId" clId="{BB0F71E6-F6EE-4C33-AB1B-410E07D32629}" dt="2022-09-13T22:46:42.167" v="6"/>
         <pc:sldMkLst>
           <pc:docMk/>
           <pc:sldMk cId="985208397" sldId="2929"/>
@@ -163,18 +160,25 @@
           <pc:sldMk cId="3839448070" sldId="3072"/>
         </pc:sldMkLst>
       </pc:sldChg>
-      <pc:sldChg chg="add">
-        <pc:chgData name="Thomas O Fredericks" userId="9a40f032a9b16fc7" providerId="LiveId" clId="{BB0F71E6-F6EE-4C33-AB1B-410E07D32629}" dt="2022-09-12T20:28:28.051" v="3"/>
+      <pc:sldChg chg="add ord">
+        <pc:chgData name="Thomas O Fredericks" userId="9a40f032a9b16fc7" providerId="LiveId" clId="{BB0F71E6-F6EE-4C33-AB1B-410E07D32629}" dt="2022-09-13T22:46:43.696" v="7"/>
         <pc:sldMkLst>
           <pc:docMk/>
           <pc:sldMk cId="3292424376" sldId="3073"/>
         </pc:sldMkLst>
       </pc:sldChg>
-      <pc:sldChg chg="add">
-        <pc:chgData name="Thomas O Fredericks" userId="9a40f032a9b16fc7" providerId="LiveId" clId="{BB0F71E6-F6EE-4C33-AB1B-410E07D32629}" dt="2022-09-12T20:28:28.051" v="3"/>
+      <pc:sldChg chg="add del">
+        <pc:chgData name="Thomas O Fredericks" userId="9a40f032a9b16fc7" providerId="LiveId" clId="{BB0F71E6-F6EE-4C33-AB1B-410E07D32629}" dt="2022-09-13T22:46:22.510" v="5" actId="2696"/>
         <pc:sldMkLst>
           <pc:docMk/>
           <pc:sldMk cId="943969791" sldId="3074"/>
+        </pc:sldMkLst>
+      </pc:sldChg>
+      <pc:sldChg chg="del">
+        <pc:chgData name="Thomas O Fredericks" userId="9a40f032a9b16fc7" providerId="LiveId" clId="{BB0F71E6-F6EE-4C33-AB1B-410E07D32629}" dt="2022-09-13T22:46:18.891" v="4" actId="2696"/>
+        <pc:sldMkLst>
+          <pc:docMk/>
+          <pc:sldMk cId="3577930283" sldId="3075"/>
         </pc:sldMkLst>
       </pc:sldChg>
     </pc:docChg>
@@ -354,7 +358,7 @@
           <a:p>
             <a:fld id="{DCDD5F17-F228-4C32-BB08-C02CB1CDA8CD}" type="datetimeFigureOut">
               <a:rPr lang="fr-CA" smtClean="0"/>
-              <a:t>2022-09-12</a:t>
+              <a:t>2022-09-13</a:t>
             </a:fld>
             <a:endParaRPr lang="fr-CA"/>
           </a:p>
@@ -554,7 +558,7 @@
           <a:p>
             <a:fld id="{DCDD5F17-F228-4C32-BB08-C02CB1CDA8CD}" type="datetimeFigureOut">
               <a:rPr lang="fr-CA" smtClean="0"/>
-              <a:t>2022-09-12</a:t>
+              <a:t>2022-09-13</a:t>
             </a:fld>
             <a:endParaRPr lang="fr-CA"/>
           </a:p>
@@ -764,7 +768,7 @@
           <a:p>
             <a:fld id="{DCDD5F17-F228-4C32-BB08-C02CB1CDA8CD}" type="datetimeFigureOut">
               <a:rPr lang="fr-CA" smtClean="0"/>
-              <a:t>2022-09-12</a:t>
+              <a:t>2022-09-13</a:t>
             </a:fld>
             <a:endParaRPr lang="fr-CA"/>
           </a:p>
@@ -964,7 +968,7 @@
           <a:p>
             <a:fld id="{DCDD5F17-F228-4C32-BB08-C02CB1CDA8CD}" type="datetimeFigureOut">
               <a:rPr lang="fr-CA" smtClean="0"/>
-              <a:t>2022-09-12</a:t>
+              <a:t>2022-09-13</a:t>
             </a:fld>
             <a:endParaRPr lang="fr-CA"/>
           </a:p>
@@ -1240,7 +1244,7 @@
           <a:p>
             <a:fld id="{DCDD5F17-F228-4C32-BB08-C02CB1CDA8CD}" type="datetimeFigureOut">
               <a:rPr lang="fr-CA" smtClean="0"/>
-              <a:t>2022-09-12</a:t>
+              <a:t>2022-09-13</a:t>
             </a:fld>
             <a:endParaRPr lang="fr-CA"/>
           </a:p>
@@ -1508,7 +1512,7 @@
           <a:p>
             <a:fld id="{DCDD5F17-F228-4C32-BB08-C02CB1CDA8CD}" type="datetimeFigureOut">
               <a:rPr lang="fr-CA" smtClean="0"/>
-              <a:t>2022-09-12</a:t>
+              <a:t>2022-09-13</a:t>
             </a:fld>
             <a:endParaRPr lang="fr-CA"/>
           </a:p>
@@ -1923,7 +1927,7 @@
           <a:p>
             <a:fld id="{DCDD5F17-F228-4C32-BB08-C02CB1CDA8CD}" type="datetimeFigureOut">
               <a:rPr lang="fr-CA" smtClean="0"/>
-              <a:t>2022-09-12</a:t>
+              <a:t>2022-09-13</a:t>
             </a:fld>
             <a:endParaRPr lang="fr-CA"/>
           </a:p>
@@ -2065,7 +2069,7 @@
           <a:p>
             <a:fld id="{DCDD5F17-F228-4C32-BB08-C02CB1CDA8CD}" type="datetimeFigureOut">
               <a:rPr lang="fr-CA" smtClean="0"/>
-              <a:t>2022-09-12</a:t>
+              <a:t>2022-09-13</a:t>
             </a:fld>
             <a:endParaRPr lang="fr-CA"/>
           </a:p>
@@ -2178,7 +2182,7 @@
           <a:p>
             <a:fld id="{DCDD5F17-F228-4C32-BB08-C02CB1CDA8CD}" type="datetimeFigureOut">
               <a:rPr lang="fr-CA" smtClean="0"/>
-              <a:t>2022-09-12</a:t>
+              <a:t>2022-09-13</a:t>
             </a:fld>
             <a:endParaRPr lang="fr-CA"/>
           </a:p>
@@ -2491,7 +2495,7 @@
           <a:p>
             <a:fld id="{DCDD5F17-F228-4C32-BB08-C02CB1CDA8CD}" type="datetimeFigureOut">
               <a:rPr lang="fr-CA" smtClean="0"/>
-              <a:t>2022-09-12</a:t>
+              <a:t>2022-09-13</a:t>
             </a:fld>
             <a:endParaRPr lang="fr-CA"/>
           </a:p>
@@ -2780,7 +2784,7 @@
           <a:p>
             <a:fld id="{DCDD5F17-F228-4C32-BB08-C02CB1CDA8CD}" type="datetimeFigureOut">
               <a:rPr lang="fr-CA" smtClean="0"/>
-              <a:t>2022-09-12</a:t>
+              <a:t>2022-09-13</a:t>
             </a:fld>
             <a:endParaRPr lang="fr-CA"/>
           </a:p>
@@ -3023,7 +3027,7 @@
           <a:p>
             <a:fld id="{DCDD5F17-F228-4C32-BB08-C02CB1CDA8CD}" type="datetimeFigureOut">
               <a:rPr lang="fr-CA" smtClean="0"/>
-              <a:t>2022-09-12</a:t>
+              <a:t>2022-09-13</a:t>
             </a:fld>
             <a:endParaRPr lang="fr-CA"/>
           </a:p>
@@ -3424,1189 +3428,6 @@
 </file>
 
 <file path=ppt/slides/slide1.xml><?xml version="1.0" encoding="utf-8"?>
-<p:sld xmlns:a="http://schemas.openxmlformats.org/drawingml/2006/main" xmlns:r="http://schemas.openxmlformats.org/officeDocument/2006/relationships" xmlns:p="http://schemas.openxmlformats.org/presentationml/2006/main">
-  <p:cSld>
-    <p:spTree>
-      <p:nvGrpSpPr>
-        <p:cNvPr id="1" name=""/>
-        <p:cNvGrpSpPr/>
-        <p:nvPr/>
-      </p:nvGrpSpPr>
-      <p:grpSpPr>
-        <a:xfrm>
-          <a:off x="0" y="0"/>
-          <a:ext cx="0" cy="0"/>
-          <a:chOff x="0" y="0"/>
-          <a:chExt cx="0" cy="0"/>
-        </a:xfrm>
-      </p:grpSpPr>
-      <p:sp>
-        <p:nvSpPr>
-          <p:cNvPr id="2" name="Titre 1">
-            <a:extLst>
-              <a:ext uri="{FF2B5EF4-FFF2-40B4-BE49-F238E27FC236}">
-                <a16:creationId xmlns:a16="http://schemas.microsoft.com/office/drawing/2014/main" id="{7005A587-273D-4A3C-859E-17AD32EABF34}"/>
-              </a:ext>
-            </a:extLst>
-          </p:cNvPr>
-          <p:cNvSpPr>
-            <a:spLocks noGrp="1"/>
-          </p:cNvSpPr>
-          <p:nvPr>
-            <p:ph type="title"/>
-          </p:nvPr>
-        </p:nvSpPr>
-        <p:spPr/>
-        <p:txBody>
-          <a:bodyPr>
-            <a:normAutofit/>
-          </a:bodyPr>
-          <a:lstStyle/>
-          <a:p>
-            <a:r>
-              <a:rPr lang="fr-CA" sz="2400" dirty="0"/>
-              <a:t>ENVOYER DES MESSAGES À PARTIR D’ARDUINO</a:t>
-            </a:r>
-          </a:p>
-        </p:txBody>
-      </p:sp>
-      <p:pic>
-        <p:nvPicPr>
-          <p:cNvPr id="10" name="Image 9">
-            <a:extLst>
-              <a:ext uri="{FF2B5EF4-FFF2-40B4-BE49-F238E27FC236}">
-                <a16:creationId xmlns:a16="http://schemas.microsoft.com/office/drawing/2014/main" id="{DF124CC7-682C-49A6-A8B4-E595218AE8F8}"/>
-              </a:ext>
-            </a:extLst>
-          </p:cNvPr>
-          <p:cNvPicPr>
-            <a:picLocks noChangeAspect="1"/>
-          </p:cNvPicPr>
-          <p:nvPr/>
-        </p:nvPicPr>
-        <p:blipFill>
-          <a:blip r:embed="rId2"/>
-          <a:stretch>
-            <a:fillRect/>
-          </a:stretch>
-        </p:blipFill>
-        <p:spPr>
-          <a:xfrm>
-            <a:off x="1009650" y="1099856"/>
-            <a:ext cx="7097115" cy="390580"/>
-          </a:xfrm>
-          <a:prstGeom prst="rect">
-            <a:avLst/>
-          </a:prstGeom>
-        </p:spPr>
-      </p:pic>
-      <p:pic>
-        <p:nvPicPr>
-          <p:cNvPr id="24" name="Image 23">
-            <a:extLst>
-              <a:ext uri="{FF2B5EF4-FFF2-40B4-BE49-F238E27FC236}">
-                <a16:creationId xmlns:a16="http://schemas.microsoft.com/office/drawing/2014/main" id="{003CB199-AC20-4FAF-A153-4203C55FE78A}"/>
-              </a:ext>
-            </a:extLst>
-          </p:cNvPr>
-          <p:cNvPicPr>
-            <a:picLocks noChangeAspect="1"/>
-          </p:cNvPicPr>
-          <p:nvPr/>
-        </p:nvPicPr>
-        <p:blipFill>
-          <a:blip r:embed="rId3"/>
-          <a:stretch>
-            <a:fillRect/>
-          </a:stretch>
-        </p:blipFill>
-        <p:spPr>
-          <a:xfrm>
-            <a:off x="1034201" y="2271430"/>
-            <a:ext cx="7182852" cy="390580"/>
-          </a:xfrm>
-          <a:prstGeom prst="rect">
-            <a:avLst/>
-          </a:prstGeom>
-        </p:spPr>
-      </p:pic>
-      <p:pic>
-        <p:nvPicPr>
-          <p:cNvPr id="25" name="Image 24">
-            <a:extLst>
-              <a:ext uri="{FF2B5EF4-FFF2-40B4-BE49-F238E27FC236}">
-                <a16:creationId xmlns:a16="http://schemas.microsoft.com/office/drawing/2014/main" id="{62D5DF4F-EF92-401A-90F2-24BE3D4DA8E2}"/>
-              </a:ext>
-            </a:extLst>
-          </p:cNvPr>
-          <p:cNvPicPr>
-            <a:picLocks noChangeAspect="1"/>
-          </p:cNvPicPr>
-          <p:nvPr/>
-        </p:nvPicPr>
-        <p:blipFill>
-          <a:blip r:embed="rId4"/>
-          <a:stretch>
-            <a:fillRect/>
-          </a:stretch>
-        </p:blipFill>
-        <p:spPr>
-          <a:xfrm>
-            <a:off x="914398" y="5802023"/>
-            <a:ext cx="7059010" cy="438211"/>
-          </a:xfrm>
-          <a:prstGeom prst="rect">
-            <a:avLst/>
-          </a:prstGeom>
-        </p:spPr>
-      </p:pic>
-      <p:sp>
-        <p:nvSpPr>
-          <p:cNvPr id="35" name="Rectangle 34">
-            <a:extLst>
-              <a:ext uri="{FF2B5EF4-FFF2-40B4-BE49-F238E27FC236}">
-                <a16:creationId xmlns:a16="http://schemas.microsoft.com/office/drawing/2014/main" id="{AF0DD6E8-5FEA-4243-9569-9BE01B461D59}"/>
-              </a:ext>
-            </a:extLst>
-          </p:cNvPr>
-          <p:cNvSpPr/>
-          <p:nvPr/>
-        </p:nvSpPr>
-        <p:spPr>
-          <a:xfrm>
-            <a:off x="4601076" y="1055415"/>
-            <a:ext cx="2094115" cy="471482"/>
-          </a:xfrm>
-          <a:prstGeom prst="rect">
-            <a:avLst/>
-          </a:prstGeom>
-          <a:solidFill>
-            <a:schemeClr val="accent3"/>
-          </a:solidFill>
-          <a:ln>
-            <a:noFill/>
-          </a:ln>
-        </p:spPr>
-        <p:style>
-          <a:lnRef idx="2">
-            <a:schemeClr val="accent1">
-              <a:shade val="50000"/>
-            </a:schemeClr>
-          </a:lnRef>
-          <a:fillRef idx="1">
-            <a:schemeClr val="accent1"/>
-          </a:fillRef>
-          <a:effectRef idx="0">
-            <a:schemeClr val="accent1"/>
-          </a:effectRef>
-          <a:fontRef idx="minor">
-            <a:schemeClr val="lt1"/>
-          </a:fontRef>
-        </p:style>
-        <p:txBody>
-          <a:bodyPr rtlCol="0" anchor="ctr"/>
-          <a:lstStyle/>
-          <a:p>
-            <a:pPr algn="ctr"/>
-            <a:r>
-              <a:rPr lang="fr-CA" sz="3200" dirty="0">
-                <a:solidFill>
-                  <a:schemeClr val="tx1"/>
-                </a:solidFill>
-              </a:rPr>
-              <a:t>baud</a:t>
-            </a:r>
-          </a:p>
-        </p:txBody>
-      </p:sp>
-      <p:sp>
-        <p:nvSpPr>
-          <p:cNvPr id="36" name="Rectangle 35">
-            <a:extLst>
-              <a:ext uri="{FF2B5EF4-FFF2-40B4-BE49-F238E27FC236}">
-                <a16:creationId xmlns:a16="http://schemas.microsoft.com/office/drawing/2014/main" id="{DCCE8C16-28D1-4898-B717-4D329F5F176B}"/>
-              </a:ext>
-            </a:extLst>
-          </p:cNvPr>
-          <p:cNvSpPr/>
-          <p:nvPr/>
-        </p:nvSpPr>
-        <p:spPr>
-          <a:xfrm>
-            <a:off x="3730969" y="2190528"/>
-            <a:ext cx="3961207" cy="471482"/>
-          </a:xfrm>
-          <a:prstGeom prst="rect">
-            <a:avLst/>
-          </a:prstGeom>
-          <a:solidFill>
-            <a:schemeClr val="accent3"/>
-          </a:solidFill>
-          <a:ln>
-            <a:noFill/>
-          </a:ln>
-        </p:spPr>
-        <p:style>
-          <a:lnRef idx="2">
-            <a:schemeClr val="accent1">
-              <a:shade val="50000"/>
-            </a:schemeClr>
-          </a:lnRef>
-          <a:fillRef idx="1">
-            <a:schemeClr val="accent1"/>
-          </a:fillRef>
-          <a:effectRef idx="0">
-            <a:schemeClr val="accent1"/>
-          </a:effectRef>
-          <a:fontRef idx="minor">
-            <a:schemeClr val="lt1"/>
-          </a:fontRef>
-        </p:style>
-        <p:txBody>
-          <a:bodyPr rtlCol="0" anchor="ctr"/>
-          <a:lstStyle/>
-          <a:p>
-            <a:pPr algn="ctr"/>
-            <a:r>
-              <a:rPr lang="fr-CA" sz="3200" dirty="0">
-                <a:solidFill>
-                  <a:schemeClr val="tx1"/>
-                </a:solidFill>
-              </a:rPr>
-              <a:t>valeur à envoyer</a:t>
-            </a:r>
-          </a:p>
-        </p:txBody>
-      </p:sp>
-      <p:sp>
-        <p:nvSpPr>
-          <p:cNvPr id="37" name="Rectangle 36">
-            <a:extLst>
-              <a:ext uri="{FF2B5EF4-FFF2-40B4-BE49-F238E27FC236}">
-                <a16:creationId xmlns:a16="http://schemas.microsoft.com/office/drawing/2014/main" id="{1E8A71B8-65DF-4B08-B832-78DB03D591F3}"/>
-              </a:ext>
-            </a:extLst>
-          </p:cNvPr>
-          <p:cNvSpPr/>
-          <p:nvPr/>
-        </p:nvSpPr>
-        <p:spPr>
-          <a:xfrm>
-            <a:off x="4211243" y="5763840"/>
-            <a:ext cx="3456382" cy="471482"/>
-          </a:xfrm>
-          <a:prstGeom prst="rect">
-            <a:avLst/>
-          </a:prstGeom>
-          <a:solidFill>
-            <a:schemeClr val="accent3"/>
-          </a:solidFill>
-          <a:ln>
-            <a:noFill/>
-          </a:ln>
-        </p:spPr>
-        <p:style>
-          <a:lnRef idx="2">
-            <a:schemeClr val="accent1">
-              <a:shade val="50000"/>
-            </a:schemeClr>
-          </a:lnRef>
-          <a:fillRef idx="1">
-            <a:schemeClr val="accent1"/>
-          </a:fillRef>
-          <a:effectRef idx="0">
-            <a:schemeClr val="accent1"/>
-          </a:effectRef>
-          <a:fontRef idx="minor">
-            <a:schemeClr val="lt1"/>
-          </a:fontRef>
-        </p:style>
-        <p:txBody>
-          <a:bodyPr rtlCol="0" anchor="ctr"/>
-          <a:lstStyle/>
-          <a:p>
-            <a:pPr algn="ctr"/>
-            <a:r>
-              <a:rPr lang="fr-CA" sz="3200" dirty="0">
-                <a:solidFill>
-                  <a:schemeClr val="tx1"/>
-                </a:solidFill>
-              </a:rPr>
-              <a:t>valeur à imprimer</a:t>
-            </a:r>
-          </a:p>
-        </p:txBody>
-      </p:sp>
-      <p:sp>
-        <p:nvSpPr>
-          <p:cNvPr id="38" name="Rectangle 37">
-            <a:extLst>
-              <a:ext uri="{FF2B5EF4-FFF2-40B4-BE49-F238E27FC236}">
-                <a16:creationId xmlns:a16="http://schemas.microsoft.com/office/drawing/2014/main" id="{0A1A45C1-C6ED-473E-AEED-2129ED1CEA1F}"/>
-              </a:ext>
-            </a:extLst>
-          </p:cNvPr>
-          <p:cNvSpPr/>
-          <p:nvPr/>
-        </p:nvSpPr>
-        <p:spPr>
-          <a:xfrm>
-            <a:off x="938949" y="2628197"/>
-            <a:ext cx="10648952" cy="369332"/>
-          </a:xfrm>
-          <a:prstGeom prst="rect">
-            <a:avLst/>
-          </a:prstGeom>
-        </p:spPr>
-        <p:txBody>
-          <a:bodyPr wrap="square">
-            <a:spAutoFit/>
-          </a:bodyPr>
-          <a:lstStyle/>
-          <a:p>
-            <a:r>
-              <a:rPr lang="fr-CA" dirty="0"/>
-              <a:t>Envoyer à l’ordinateur une valeur en mode texte.</a:t>
-            </a:r>
-          </a:p>
-        </p:txBody>
-      </p:sp>
-      <p:sp>
-        <p:nvSpPr>
-          <p:cNvPr id="39" name="Rectangle 38">
-            <a:extLst>
-              <a:ext uri="{FF2B5EF4-FFF2-40B4-BE49-F238E27FC236}">
-                <a16:creationId xmlns:a16="http://schemas.microsoft.com/office/drawing/2014/main" id="{AD5C3158-B106-4F9A-9755-3024C2CF7630}"/>
-              </a:ext>
-            </a:extLst>
-          </p:cNvPr>
-          <p:cNvSpPr/>
-          <p:nvPr/>
-        </p:nvSpPr>
-        <p:spPr>
-          <a:xfrm>
-            <a:off x="864817" y="6144968"/>
-            <a:ext cx="10648952" cy="369332"/>
-          </a:xfrm>
-          <a:prstGeom prst="rect">
-            <a:avLst/>
-          </a:prstGeom>
-        </p:spPr>
-        <p:txBody>
-          <a:bodyPr wrap="square">
-            <a:spAutoFit/>
-          </a:bodyPr>
-          <a:lstStyle/>
-          <a:p>
-            <a:r>
-              <a:rPr lang="fr-CA" dirty="0"/>
-              <a:t>Envoyer à l’ordinateur une valeur en mode texte, suivi l’ordinateur un retour à la ligne (ln) et un retour de chariot (</a:t>
-            </a:r>
-            <a:r>
-              <a:rPr lang="fr-CA" dirty="0" err="1"/>
-              <a:t>cr</a:t>
-            </a:r>
-            <a:r>
-              <a:rPr lang="fr-CA" dirty="0"/>
-              <a:t>).</a:t>
-            </a:r>
-          </a:p>
-        </p:txBody>
-      </p:sp>
-      <p:pic>
-        <p:nvPicPr>
-          <p:cNvPr id="12" name="Image 11">
-            <a:extLst>
-              <a:ext uri="{FF2B5EF4-FFF2-40B4-BE49-F238E27FC236}">
-                <a16:creationId xmlns:a16="http://schemas.microsoft.com/office/drawing/2014/main" id="{34300FA1-F18C-4935-90C5-0B7A4C111AC0}"/>
-              </a:ext>
-            </a:extLst>
-          </p:cNvPr>
-          <p:cNvPicPr>
-            <a:picLocks noChangeAspect="1"/>
-          </p:cNvPicPr>
-          <p:nvPr/>
-        </p:nvPicPr>
-        <p:blipFill rotWithShape="1">
-          <a:blip r:embed="rId3"/>
-          <a:srcRect r="62924"/>
-          <a:stretch/>
-        </p:blipFill>
-        <p:spPr>
-          <a:xfrm>
-            <a:off x="1042747" y="3129969"/>
-            <a:ext cx="2663115" cy="390580"/>
-          </a:xfrm>
-          <a:prstGeom prst="rect">
-            <a:avLst/>
-          </a:prstGeom>
-        </p:spPr>
-      </p:pic>
-      <p:sp>
-        <p:nvSpPr>
-          <p:cNvPr id="13" name="Rectangle 12">
-            <a:extLst>
-              <a:ext uri="{FF2B5EF4-FFF2-40B4-BE49-F238E27FC236}">
-                <a16:creationId xmlns:a16="http://schemas.microsoft.com/office/drawing/2014/main" id="{1ADCC9A1-73F5-469B-B921-DD342EDC178B}"/>
-              </a:ext>
-            </a:extLst>
-          </p:cNvPr>
-          <p:cNvSpPr/>
-          <p:nvPr/>
-        </p:nvSpPr>
-        <p:spPr>
-          <a:xfrm>
-            <a:off x="3730969" y="3042086"/>
-            <a:ext cx="2663115" cy="471482"/>
-          </a:xfrm>
-          <a:prstGeom prst="rect">
-            <a:avLst/>
-          </a:prstGeom>
-          <a:solidFill>
-            <a:schemeClr val="accent3"/>
-          </a:solidFill>
-          <a:ln>
-            <a:noFill/>
-          </a:ln>
-        </p:spPr>
-        <p:style>
-          <a:lnRef idx="2">
-            <a:schemeClr val="accent1">
-              <a:shade val="50000"/>
-            </a:schemeClr>
-          </a:lnRef>
-          <a:fillRef idx="1">
-            <a:schemeClr val="accent1"/>
-          </a:fillRef>
-          <a:effectRef idx="0">
-            <a:schemeClr val="accent1"/>
-          </a:effectRef>
-          <a:fontRef idx="minor">
-            <a:schemeClr val="lt1"/>
-          </a:fontRef>
-        </p:style>
-        <p:txBody>
-          <a:bodyPr rtlCol="0" anchor="ctr"/>
-          <a:lstStyle/>
-          <a:p>
-            <a:pPr algn="ctr"/>
-            <a:r>
-              <a:rPr lang="fr-CA" sz="3200" dirty="0">
-                <a:solidFill>
-                  <a:schemeClr val="tx1"/>
-                </a:solidFill>
-              </a:rPr>
-              <a:t>texte à envoyer</a:t>
-            </a:r>
-          </a:p>
-        </p:txBody>
-      </p:sp>
-      <p:sp>
-        <p:nvSpPr>
-          <p:cNvPr id="14" name="Rectangle 13">
-            <a:extLst>
-              <a:ext uri="{FF2B5EF4-FFF2-40B4-BE49-F238E27FC236}">
-                <a16:creationId xmlns:a16="http://schemas.microsoft.com/office/drawing/2014/main" id="{C01A2274-2F80-419F-AAE0-D3132ECE57FB}"/>
-              </a:ext>
-            </a:extLst>
-          </p:cNvPr>
-          <p:cNvSpPr/>
-          <p:nvPr/>
-        </p:nvSpPr>
-        <p:spPr>
-          <a:xfrm>
-            <a:off x="947495" y="3523029"/>
-            <a:ext cx="10648952" cy="369332"/>
-          </a:xfrm>
-          <a:prstGeom prst="rect">
-            <a:avLst/>
-          </a:prstGeom>
-        </p:spPr>
-        <p:txBody>
-          <a:bodyPr wrap="square">
-            <a:spAutoFit/>
-          </a:bodyPr>
-          <a:lstStyle/>
-          <a:p>
-            <a:r>
-              <a:rPr lang="fr-CA" dirty="0"/>
-              <a:t>Envoyer à l’ordinateur du texte.</a:t>
-            </a:r>
-          </a:p>
-        </p:txBody>
-      </p:sp>
-      <p:pic>
-        <p:nvPicPr>
-          <p:cNvPr id="15" name="Image 14">
-            <a:extLst>
-              <a:ext uri="{FF2B5EF4-FFF2-40B4-BE49-F238E27FC236}">
-                <a16:creationId xmlns:a16="http://schemas.microsoft.com/office/drawing/2014/main" id="{BA7DB3AF-15BB-4997-81CA-DE0DDB353E54}"/>
-              </a:ext>
-            </a:extLst>
-          </p:cNvPr>
-          <p:cNvPicPr>
-            <a:picLocks noChangeAspect="1"/>
-          </p:cNvPicPr>
-          <p:nvPr/>
-        </p:nvPicPr>
-        <p:blipFill rotWithShape="1">
-          <a:blip r:embed="rId4"/>
-          <a:srcRect r="56203"/>
-          <a:stretch/>
-        </p:blipFill>
-        <p:spPr>
-          <a:xfrm>
-            <a:off x="933452" y="4994815"/>
-            <a:ext cx="3091617" cy="438211"/>
-          </a:xfrm>
-          <a:prstGeom prst="rect">
-            <a:avLst/>
-          </a:prstGeom>
-        </p:spPr>
-      </p:pic>
-      <p:sp>
-        <p:nvSpPr>
-          <p:cNvPr id="17" name="Rectangle 16">
-            <a:extLst>
-              <a:ext uri="{FF2B5EF4-FFF2-40B4-BE49-F238E27FC236}">
-                <a16:creationId xmlns:a16="http://schemas.microsoft.com/office/drawing/2014/main" id="{778CDE14-5537-4CC0-AF1F-878CC7943659}"/>
-              </a:ext>
-            </a:extLst>
-          </p:cNvPr>
-          <p:cNvSpPr/>
-          <p:nvPr/>
-        </p:nvSpPr>
-        <p:spPr>
-          <a:xfrm>
-            <a:off x="914398" y="5342669"/>
-            <a:ext cx="10648952" cy="369332"/>
-          </a:xfrm>
-          <a:prstGeom prst="rect">
-            <a:avLst/>
-          </a:prstGeom>
-        </p:spPr>
-        <p:txBody>
-          <a:bodyPr wrap="square" lIns="91440" tIns="45720" rIns="91440" bIns="45720" anchor="t">
-            <a:spAutoFit/>
-          </a:bodyPr>
-          <a:lstStyle/>
-          <a:p>
-            <a:r>
-              <a:rPr lang="fr-CA" dirty="0"/>
-              <a:t>Envoyer à l’ordinateur un retour à la ligne (</a:t>
-            </a:r>
-            <a:r>
-              <a:rPr lang="fr-CA" dirty="0" err="1"/>
-              <a:t>lf</a:t>
-            </a:r>
-            <a:r>
-              <a:rPr lang="fr-CA" dirty="0"/>
-              <a:t>) et un retour de chariot (</a:t>
-            </a:r>
-            <a:r>
-              <a:rPr lang="fr-CA" dirty="0" err="1"/>
-              <a:t>cr</a:t>
-            </a:r>
-            <a:r>
-              <a:rPr lang="fr-CA" dirty="0"/>
-              <a:t>). </a:t>
-            </a:r>
-            <a:r>
-              <a:rPr lang="fr-CA" b="1" dirty="0">
-                <a:solidFill>
-                  <a:schemeClr val="bg1"/>
-                </a:solidFill>
-                <a:highlight>
-                  <a:srgbClr val="FF0000"/>
-                </a:highlight>
-              </a:rPr>
-              <a:t>Permet de terminer le message.</a:t>
-            </a:r>
-          </a:p>
-        </p:txBody>
-      </p:sp>
-      <p:pic>
-        <p:nvPicPr>
-          <p:cNvPr id="18" name="Image 17">
-            <a:extLst>
-              <a:ext uri="{FF2B5EF4-FFF2-40B4-BE49-F238E27FC236}">
-                <a16:creationId xmlns:a16="http://schemas.microsoft.com/office/drawing/2014/main" id="{0B87A24F-FDEF-44B7-8D55-A6648CCF0FB1}"/>
-              </a:ext>
-            </a:extLst>
-          </p:cNvPr>
-          <p:cNvPicPr>
-            <a:picLocks noChangeAspect="1"/>
-          </p:cNvPicPr>
-          <p:nvPr/>
-        </p:nvPicPr>
-        <p:blipFill rotWithShape="1">
-          <a:blip r:embed="rId4"/>
-          <a:srcRect l="96842"/>
-          <a:stretch/>
-        </p:blipFill>
-        <p:spPr>
-          <a:xfrm>
-            <a:off x="3913613" y="5052962"/>
-            <a:ext cx="222911" cy="438211"/>
-          </a:xfrm>
-          <a:prstGeom prst="rect">
-            <a:avLst/>
-          </a:prstGeom>
-        </p:spPr>
-      </p:pic>
-      <p:sp>
-        <p:nvSpPr>
-          <p:cNvPr id="22" name="Rectangle 21">
-            <a:extLst>
-              <a:ext uri="{FF2B5EF4-FFF2-40B4-BE49-F238E27FC236}">
-                <a16:creationId xmlns:a16="http://schemas.microsoft.com/office/drawing/2014/main" id="{70B19C9E-1EE9-4FE6-ACEB-72C92C1001EB}"/>
-              </a:ext>
-            </a:extLst>
-          </p:cNvPr>
-          <p:cNvSpPr/>
-          <p:nvPr/>
-        </p:nvSpPr>
-        <p:spPr>
-          <a:xfrm>
-            <a:off x="933452" y="1496942"/>
-            <a:ext cx="10648952" cy="369332"/>
-          </a:xfrm>
-          <a:prstGeom prst="rect">
-            <a:avLst/>
-          </a:prstGeom>
-        </p:spPr>
-        <p:txBody>
-          <a:bodyPr wrap="square">
-            <a:spAutoFit/>
-          </a:bodyPr>
-          <a:lstStyle/>
-          <a:p>
-            <a:r>
-              <a:rPr lang="fr-CA" dirty="0"/>
-              <a:t>Initialiser la communication à une certaine vitesse. Voir la diapositive suivante à propos des vitesses de baud.</a:t>
-            </a:r>
-          </a:p>
-        </p:txBody>
-      </p:sp>
-      <p:sp>
-        <p:nvSpPr>
-          <p:cNvPr id="23" name="Rectangle 22">
-            <a:extLst>
-              <a:ext uri="{FF2B5EF4-FFF2-40B4-BE49-F238E27FC236}">
-                <a16:creationId xmlns:a16="http://schemas.microsoft.com/office/drawing/2014/main" id="{4CC5E0FA-373B-42C8-AA5C-7A50BE0A6A8E}"/>
-              </a:ext>
-            </a:extLst>
-          </p:cNvPr>
-          <p:cNvSpPr/>
-          <p:nvPr/>
-        </p:nvSpPr>
-        <p:spPr>
-          <a:xfrm>
-            <a:off x="3448449" y="2966018"/>
-            <a:ext cx="398030" cy="471482"/>
-          </a:xfrm>
-          <a:prstGeom prst="rect">
-            <a:avLst/>
-          </a:prstGeom>
-          <a:noFill/>
-          <a:ln>
-            <a:noFill/>
-          </a:ln>
-        </p:spPr>
-        <p:style>
-          <a:lnRef idx="2">
-            <a:schemeClr val="accent1">
-              <a:shade val="50000"/>
-            </a:schemeClr>
-          </a:lnRef>
-          <a:fillRef idx="1">
-            <a:schemeClr val="accent1"/>
-          </a:fillRef>
-          <a:effectRef idx="0">
-            <a:schemeClr val="accent1"/>
-          </a:effectRef>
-          <a:fontRef idx="minor">
-            <a:schemeClr val="lt1"/>
-          </a:fontRef>
-        </p:style>
-        <p:txBody>
-          <a:bodyPr rtlCol="0" anchor="ctr"/>
-          <a:lstStyle/>
-          <a:p>
-            <a:pPr algn="ctr"/>
-            <a:r>
-              <a:rPr lang="fr-CA" sz="3200" dirty="0">
-                <a:solidFill>
-                  <a:schemeClr val="tx1"/>
-                </a:solidFill>
-              </a:rPr>
-              <a:t>"</a:t>
-            </a:r>
-          </a:p>
-        </p:txBody>
-      </p:sp>
-      <p:sp>
-        <p:nvSpPr>
-          <p:cNvPr id="27" name="Rectangle 26">
-            <a:extLst>
-              <a:ext uri="{FF2B5EF4-FFF2-40B4-BE49-F238E27FC236}">
-                <a16:creationId xmlns:a16="http://schemas.microsoft.com/office/drawing/2014/main" id="{FF2667FF-D333-4E55-B402-5DB57CD214FE}"/>
-              </a:ext>
-            </a:extLst>
-          </p:cNvPr>
-          <p:cNvSpPr/>
-          <p:nvPr/>
-        </p:nvSpPr>
-        <p:spPr>
-          <a:xfrm>
-            <a:off x="6263425" y="2964721"/>
-            <a:ext cx="398030" cy="471482"/>
-          </a:xfrm>
-          <a:prstGeom prst="rect">
-            <a:avLst/>
-          </a:prstGeom>
-          <a:noFill/>
-          <a:ln>
-            <a:noFill/>
-          </a:ln>
-        </p:spPr>
-        <p:style>
-          <a:lnRef idx="2">
-            <a:schemeClr val="accent1">
-              <a:shade val="50000"/>
-            </a:schemeClr>
-          </a:lnRef>
-          <a:fillRef idx="1">
-            <a:schemeClr val="accent1"/>
-          </a:fillRef>
-          <a:effectRef idx="0">
-            <a:schemeClr val="accent1"/>
-          </a:effectRef>
-          <a:fontRef idx="minor">
-            <a:schemeClr val="lt1"/>
-          </a:fontRef>
-        </p:style>
-        <p:txBody>
-          <a:bodyPr rtlCol="0" anchor="ctr"/>
-          <a:lstStyle/>
-          <a:p>
-            <a:pPr algn="ctr"/>
-            <a:r>
-              <a:rPr lang="fr-CA" sz="3200" dirty="0">
-                <a:solidFill>
-                  <a:schemeClr val="tx1"/>
-                </a:solidFill>
-              </a:rPr>
-              <a:t>"</a:t>
-            </a:r>
-          </a:p>
-        </p:txBody>
-      </p:sp>
-      <p:pic>
-        <p:nvPicPr>
-          <p:cNvPr id="28" name="Image 27">
-            <a:extLst>
-              <a:ext uri="{FF2B5EF4-FFF2-40B4-BE49-F238E27FC236}">
-                <a16:creationId xmlns:a16="http://schemas.microsoft.com/office/drawing/2014/main" id="{9FC6F654-67E4-47FB-9635-713C12925D80}"/>
-              </a:ext>
-            </a:extLst>
-          </p:cNvPr>
-          <p:cNvPicPr>
-            <a:picLocks noChangeAspect="1"/>
-          </p:cNvPicPr>
-          <p:nvPr/>
-        </p:nvPicPr>
-        <p:blipFill rotWithShape="1">
-          <a:blip r:embed="rId4"/>
-          <a:srcRect l="96842"/>
-          <a:stretch/>
-        </p:blipFill>
-        <p:spPr>
-          <a:xfrm>
-            <a:off x="6512089" y="3087925"/>
-            <a:ext cx="222911" cy="438211"/>
-          </a:xfrm>
-          <a:prstGeom prst="rect">
-            <a:avLst/>
-          </a:prstGeom>
-        </p:spPr>
-      </p:pic>
-      <p:pic>
-        <p:nvPicPr>
-          <p:cNvPr id="29" name="Image 28">
-            <a:extLst>
-              <a:ext uri="{FF2B5EF4-FFF2-40B4-BE49-F238E27FC236}">
-                <a16:creationId xmlns:a16="http://schemas.microsoft.com/office/drawing/2014/main" id="{F56787CC-707F-481B-A62E-2D728D136EFC}"/>
-              </a:ext>
-            </a:extLst>
-          </p:cNvPr>
-          <p:cNvPicPr>
-            <a:picLocks noChangeAspect="1"/>
-          </p:cNvPicPr>
-          <p:nvPr/>
-        </p:nvPicPr>
-        <p:blipFill rotWithShape="1">
-          <a:blip r:embed="rId3"/>
-          <a:srcRect r="62924"/>
-          <a:stretch/>
-        </p:blipFill>
-        <p:spPr>
-          <a:xfrm>
-            <a:off x="1042747" y="3932006"/>
-            <a:ext cx="2663115" cy="390580"/>
-          </a:xfrm>
-          <a:prstGeom prst="rect">
-            <a:avLst/>
-          </a:prstGeom>
-        </p:spPr>
-      </p:pic>
-      <p:sp>
-        <p:nvSpPr>
-          <p:cNvPr id="30" name="Rectangle 29">
-            <a:extLst>
-              <a:ext uri="{FF2B5EF4-FFF2-40B4-BE49-F238E27FC236}">
-                <a16:creationId xmlns:a16="http://schemas.microsoft.com/office/drawing/2014/main" id="{EF21FC52-C2B3-4EF5-A5D4-F9B0CFC900EC}"/>
-              </a:ext>
-            </a:extLst>
-          </p:cNvPr>
-          <p:cNvSpPr/>
-          <p:nvPr/>
-        </p:nvSpPr>
-        <p:spPr>
-          <a:xfrm>
-            <a:off x="947495" y="4282336"/>
-            <a:ext cx="10648952" cy="369332"/>
-          </a:xfrm>
-          <a:prstGeom prst="rect">
-            <a:avLst/>
-          </a:prstGeom>
-        </p:spPr>
-        <p:txBody>
-          <a:bodyPr wrap="square">
-            <a:spAutoFit/>
-          </a:bodyPr>
-          <a:lstStyle/>
-          <a:p>
-            <a:r>
-              <a:rPr lang="fr-CA" dirty="0"/>
-              <a:t>Envoyer à l’ordinateur un espace pour séparer les éléments d’un message.</a:t>
-            </a:r>
-          </a:p>
-        </p:txBody>
-      </p:sp>
-      <p:sp>
-        <p:nvSpPr>
-          <p:cNvPr id="3" name="Accolade ouvrante 2">
-            <a:extLst>
-              <a:ext uri="{FF2B5EF4-FFF2-40B4-BE49-F238E27FC236}">
-                <a16:creationId xmlns:a16="http://schemas.microsoft.com/office/drawing/2014/main" id="{AC9CBD84-89E7-43A2-9951-317C44FABE7D}"/>
-              </a:ext>
-            </a:extLst>
-          </p:cNvPr>
-          <p:cNvSpPr/>
-          <p:nvPr/>
-        </p:nvSpPr>
-        <p:spPr>
-          <a:xfrm>
-            <a:off x="838200" y="1064638"/>
-            <a:ext cx="179996" cy="840120"/>
-          </a:xfrm>
-          <a:prstGeom prst="leftBrace">
-            <a:avLst>
-              <a:gd name="adj1" fmla="val 41505"/>
-              <a:gd name="adj2" fmla="val 47988"/>
-            </a:avLst>
-          </a:prstGeom>
-          <a:ln w="38100">
-            <a:solidFill>
-              <a:schemeClr val="accent1"/>
-            </a:solidFill>
-          </a:ln>
-        </p:spPr>
-        <p:style>
-          <a:lnRef idx="1">
-            <a:schemeClr val="accent1"/>
-          </a:lnRef>
-          <a:fillRef idx="0">
-            <a:schemeClr val="accent1"/>
-          </a:fillRef>
-          <a:effectRef idx="0">
-            <a:schemeClr val="accent1"/>
-          </a:effectRef>
-          <a:fontRef idx="minor">
-            <a:schemeClr val="tx1"/>
-          </a:fontRef>
-        </p:style>
-        <p:txBody>
-          <a:bodyPr rtlCol="0" anchor="ctr"/>
-          <a:lstStyle/>
-          <a:p>
-            <a:pPr algn="ctr"/>
-            <a:endParaRPr lang="fr-CA"/>
-          </a:p>
-        </p:txBody>
-      </p:sp>
-      <p:sp>
-        <p:nvSpPr>
-          <p:cNvPr id="31" name="Accolade ouvrante 30">
-            <a:extLst>
-              <a:ext uri="{FF2B5EF4-FFF2-40B4-BE49-F238E27FC236}">
-                <a16:creationId xmlns:a16="http://schemas.microsoft.com/office/drawing/2014/main" id="{B471079F-5F97-4899-A9AB-C09244A8B507}"/>
-              </a:ext>
-            </a:extLst>
-          </p:cNvPr>
-          <p:cNvSpPr/>
-          <p:nvPr/>
-        </p:nvSpPr>
-        <p:spPr>
-          <a:xfrm>
-            <a:off x="802943" y="2364625"/>
-            <a:ext cx="222910" cy="2226517"/>
-          </a:xfrm>
-          <a:prstGeom prst="leftBrace">
-            <a:avLst>
-              <a:gd name="adj1" fmla="val 41505"/>
-              <a:gd name="adj2" fmla="val 47988"/>
-            </a:avLst>
-          </a:prstGeom>
-          <a:ln w="38100">
-            <a:solidFill>
-              <a:schemeClr val="accent1"/>
-            </a:solidFill>
-          </a:ln>
-        </p:spPr>
-        <p:style>
-          <a:lnRef idx="1">
-            <a:schemeClr val="accent1"/>
-          </a:lnRef>
-          <a:fillRef idx="0">
-            <a:schemeClr val="accent1"/>
-          </a:fillRef>
-          <a:effectRef idx="0">
-            <a:schemeClr val="accent1"/>
-          </a:effectRef>
-          <a:fontRef idx="minor">
-            <a:schemeClr val="tx1"/>
-          </a:fontRef>
-        </p:style>
-        <p:txBody>
-          <a:bodyPr rtlCol="0" anchor="ctr"/>
-          <a:lstStyle/>
-          <a:p>
-            <a:pPr algn="ctr"/>
-            <a:endParaRPr lang="fr-CA"/>
-          </a:p>
-        </p:txBody>
-      </p:sp>
-      <p:sp>
-        <p:nvSpPr>
-          <p:cNvPr id="32" name="Accolade ouvrante 31">
-            <a:extLst>
-              <a:ext uri="{FF2B5EF4-FFF2-40B4-BE49-F238E27FC236}">
-                <a16:creationId xmlns:a16="http://schemas.microsoft.com/office/drawing/2014/main" id="{4CAAE708-968B-42A9-9AE7-5BB5461DE192}"/>
-              </a:ext>
-            </a:extLst>
-          </p:cNvPr>
-          <p:cNvSpPr/>
-          <p:nvPr/>
-        </p:nvSpPr>
-        <p:spPr>
-          <a:xfrm>
-            <a:off x="741357" y="5052962"/>
-            <a:ext cx="222910" cy="1456863"/>
-          </a:xfrm>
-          <a:prstGeom prst="leftBrace">
-            <a:avLst>
-              <a:gd name="adj1" fmla="val 41505"/>
-              <a:gd name="adj2" fmla="val 47988"/>
-            </a:avLst>
-          </a:prstGeom>
-          <a:ln w="38100">
-            <a:solidFill>
-              <a:schemeClr val="accent1"/>
-            </a:solidFill>
-          </a:ln>
-        </p:spPr>
-        <p:style>
-          <a:lnRef idx="1">
-            <a:schemeClr val="accent1"/>
-          </a:lnRef>
-          <a:fillRef idx="0">
-            <a:schemeClr val="accent1"/>
-          </a:fillRef>
-          <a:effectRef idx="0">
-            <a:schemeClr val="accent1"/>
-          </a:effectRef>
-          <a:fontRef idx="minor">
-            <a:schemeClr val="tx1"/>
-          </a:fontRef>
-        </p:style>
-        <p:txBody>
-          <a:bodyPr rtlCol="0" anchor="ctr"/>
-          <a:lstStyle/>
-          <a:p>
-            <a:pPr algn="ctr"/>
-            <a:endParaRPr lang="fr-CA"/>
-          </a:p>
-        </p:txBody>
-      </p:sp>
-      <p:sp>
-        <p:nvSpPr>
-          <p:cNvPr id="33" name="Rectangle 32">
-            <a:extLst>
-              <a:ext uri="{FF2B5EF4-FFF2-40B4-BE49-F238E27FC236}">
-                <a16:creationId xmlns:a16="http://schemas.microsoft.com/office/drawing/2014/main" id="{7D558F80-E676-4758-86BF-FD4BEFB2F516}"/>
-              </a:ext>
-            </a:extLst>
-          </p:cNvPr>
-          <p:cNvSpPr/>
-          <p:nvPr/>
-        </p:nvSpPr>
-        <p:spPr>
-          <a:xfrm>
-            <a:off x="3445624" y="3794919"/>
-            <a:ext cx="398030" cy="471482"/>
-          </a:xfrm>
-          <a:prstGeom prst="rect">
-            <a:avLst/>
-          </a:prstGeom>
-          <a:noFill/>
-          <a:ln>
-            <a:noFill/>
-          </a:ln>
-        </p:spPr>
-        <p:style>
-          <a:lnRef idx="2">
-            <a:schemeClr val="accent1">
-              <a:shade val="50000"/>
-            </a:schemeClr>
-          </a:lnRef>
-          <a:fillRef idx="1">
-            <a:schemeClr val="accent1"/>
-          </a:fillRef>
-          <a:effectRef idx="0">
-            <a:schemeClr val="accent1"/>
-          </a:effectRef>
-          <a:fontRef idx="minor">
-            <a:schemeClr val="lt1"/>
-          </a:fontRef>
-        </p:style>
-        <p:txBody>
-          <a:bodyPr rtlCol="0" anchor="ctr"/>
-          <a:lstStyle/>
-          <a:p>
-            <a:pPr algn="ctr"/>
-            <a:r>
-              <a:rPr lang="fr-CA" sz="3200" dirty="0">
-                <a:solidFill>
-                  <a:schemeClr val="tx1"/>
-                </a:solidFill>
-              </a:rPr>
-              <a:t>"</a:t>
-            </a:r>
-          </a:p>
-        </p:txBody>
-      </p:sp>
-      <p:sp>
-        <p:nvSpPr>
-          <p:cNvPr id="34" name="Rectangle 33">
-            <a:extLst>
-              <a:ext uri="{FF2B5EF4-FFF2-40B4-BE49-F238E27FC236}">
-                <a16:creationId xmlns:a16="http://schemas.microsoft.com/office/drawing/2014/main" id="{94B9C31D-6513-4628-A251-D4DAAF209348}"/>
-              </a:ext>
-            </a:extLst>
-          </p:cNvPr>
-          <p:cNvSpPr/>
-          <p:nvPr/>
-        </p:nvSpPr>
-        <p:spPr>
-          <a:xfrm>
-            <a:off x="3962060" y="3810854"/>
-            <a:ext cx="398030" cy="471482"/>
-          </a:xfrm>
-          <a:prstGeom prst="rect">
-            <a:avLst/>
-          </a:prstGeom>
-          <a:noFill/>
-          <a:ln>
-            <a:noFill/>
-          </a:ln>
-        </p:spPr>
-        <p:style>
-          <a:lnRef idx="2">
-            <a:schemeClr val="accent1">
-              <a:shade val="50000"/>
-            </a:schemeClr>
-          </a:lnRef>
-          <a:fillRef idx="1">
-            <a:schemeClr val="accent1"/>
-          </a:fillRef>
-          <a:effectRef idx="0">
-            <a:schemeClr val="accent1"/>
-          </a:effectRef>
-          <a:fontRef idx="minor">
-            <a:schemeClr val="lt1"/>
-          </a:fontRef>
-        </p:style>
-        <p:txBody>
-          <a:bodyPr rtlCol="0" anchor="ctr"/>
-          <a:lstStyle/>
-          <a:p>
-            <a:pPr algn="ctr"/>
-            <a:r>
-              <a:rPr lang="fr-CA" sz="3200" dirty="0">
-                <a:solidFill>
-                  <a:schemeClr val="tx1"/>
-                </a:solidFill>
-              </a:rPr>
-              <a:t>"</a:t>
-            </a:r>
-          </a:p>
-        </p:txBody>
-      </p:sp>
-      <p:pic>
-        <p:nvPicPr>
-          <p:cNvPr id="40" name="Image 39">
-            <a:extLst>
-              <a:ext uri="{FF2B5EF4-FFF2-40B4-BE49-F238E27FC236}">
-                <a16:creationId xmlns:a16="http://schemas.microsoft.com/office/drawing/2014/main" id="{2364D956-CC5B-43B5-A52B-371B9E58D73C}"/>
-              </a:ext>
-            </a:extLst>
-          </p:cNvPr>
-          <p:cNvPicPr>
-            <a:picLocks noChangeAspect="1"/>
-          </p:cNvPicPr>
-          <p:nvPr/>
-        </p:nvPicPr>
-        <p:blipFill rotWithShape="1">
-          <a:blip r:embed="rId4"/>
-          <a:srcRect l="96842"/>
-          <a:stretch/>
-        </p:blipFill>
-        <p:spPr>
-          <a:xfrm>
-            <a:off x="4235794" y="3908171"/>
-            <a:ext cx="222911" cy="438211"/>
-          </a:xfrm>
-          <a:prstGeom prst="rect">
-            <a:avLst/>
-          </a:prstGeom>
-        </p:spPr>
-      </p:pic>
-    </p:spTree>
-    <p:extLst>
-      <p:ext uri="{BB962C8B-B14F-4D97-AF65-F5344CB8AC3E}">
-        <p14:creationId xmlns:p14="http://schemas.microsoft.com/office/powerpoint/2010/main" val="1953261855"/>
-      </p:ext>
-    </p:extLst>
-  </p:cSld>
-  <p:clrMapOvr>
-    <a:masterClrMapping/>
-  </p:clrMapOvr>
-</p:sld>
-</file>
-
-<file path=ppt/slides/slide2.xml><?xml version="1.0" encoding="utf-8"?>
 <p:sld xmlns:a="http://schemas.openxmlformats.org/drawingml/2006/main" xmlns:r="http://schemas.openxmlformats.org/officeDocument/2006/relationships" xmlns:p="http://schemas.openxmlformats.org/presentationml/2006/main">
   <p:cSld>
     <p:spTree>
@@ -5244,6 +4065,443 @@
 </p:sld>
 </file>
 
+<file path=ppt/slides/slide2.xml><?xml version="1.0" encoding="utf-8"?>
+<p:sld xmlns:a="http://schemas.openxmlformats.org/drawingml/2006/main" xmlns:r="http://schemas.openxmlformats.org/officeDocument/2006/relationships" xmlns:p="http://schemas.openxmlformats.org/presentationml/2006/main">
+  <p:cSld>
+    <p:spTree>
+      <p:nvGrpSpPr>
+        <p:cNvPr id="1" name=""/>
+        <p:cNvGrpSpPr/>
+        <p:nvPr/>
+      </p:nvGrpSpPr>
+      <p:grpSpPr>
+        <a:xfrm>
+          <a:off x="0" y="0"/>
+          <a:ext cx="0" cy="0"/>
+          <a:chOff x="0" y="0"/>
+          <a:chExt cx="0" cy="0"/>
+        </a:xfrm>
+      </p:grpSpPr>
+      <p:sp>
+        <p:nvSpPr>
+          <p:cNvPr id="2" name="Titre 1">
+            <a:extLst>
+              <a:ext uri="{FF2B5EF4-FFF2-40B4-BE49-F238E27FC236}">
+                <a16:creationId xmlns:a16="http://schemas.microsoft.com/office/drawing/2014/main" id="{7005A587-273D-4A3C-859E-17AD32EABF34}"/>
+              </a:ext>
+            </a:extLst>
+          </p:cNvPr>
+          <p:cNvSpPr>
+            <a:spLocks noGrp="1"/>
+          </p:cNvSpPr>
+          <p:nvPr>
+            <p:ph type="title"/>
+          </p:nvPr>
+        </p:nvSpPr>
+        <p:spPr/>
+        <p:txBody>
+          <a:bodyPr>
+            <a:normAutofit/>
+          </a:bodyPr>
+          <a:lstStyle/>
+          <a:p>
+            <a:r>
+              <a:rPr lang="fr-CA" sz="2400" dirty="0"/>
+              <a:t>DÉBOGUER AVEC Serial</a:t>
+            </a:r>
+          </a:p>
+        </p:txBody>
+      </p:sp>
+      <p:pic>
+        <p:nvPicPr>
+          <p:cNvPr id="10" name="Image 9">
+            <a:extLst>
+              <a:ext uri="{FF2B5EF4-FFF2-40B4-BE49-F238E27FC236}">
+                <a16:creationId xmlns:a16="http://schemas.microsoft.com/office/drawing/2014/main" id="{DF124CC7-682C-49A6-A8B4-E595218AE8F8}"/>
+              </a:ext>
+            </a:extLst>
+          </p:cNvPr>
+          <p:cNvPicPr>
+            <a:picLocks noChangeAspect="1"/>
+          </p:cNvPicPr>
+          <p:nvPr/>
+        </p:nvPicPr>
+        <p:blipFill>
+          <a:blip r:embed="rId2"/>
+          <a:stretch>
+            <a:fillRect/>
+          </a:stretch>
+        </p:blipFill>
+        <p:spPr>
+          <a:xfrm>
+            <a:off x="1009650" y="1458785"/>
+            <a:ext cx="7097115" cy="390580"/>
+          </a:xfrm>
+          <a:prstGeom prst="rect">
+            <a:avLst/>
+          </a:prstGeom>
+        </p:spPr>
+      </p:pic>
+      <p:pic>
+        <p:nvPicPr>
+          <p:cNvPr id="24" name="Image 23">
+            <a:extLst>
+              <a:ext uri="{FF2B5EF4-FFF2-40B4-BE49-F238E27FC236}">
+                <a16:creationId xmlns:a16="http://schemas.microsoft.com/office/drawing/2014/main" id="{003CB199-AC20-4FAF-A153-4203C55FE78A}"/>
+              </a:ext>
+            </a:extLst>
+          </p:cNvPr>
+          <p:cNvPicPr>
+            <a:picLocks noChangeAspect="1"/>
+          </p:cNvPicPr>
+          <p:nvPr/>
+        </p:nvPicPr>
+        <p:blipFill>
+          <a:blip r:embed="rId3"/>
+          <a:stretch>
+            <a:fillRect/>
+          </a:stretch>
+        </p:blipFill>
+        <p:spPr>
+          <a:xfrm>
+            <a:off x="1009650" y="3164091"/>
+            <a:ext cx="7182852" cy="390580"/>
+          </a:xfrm>
+          <a:prstGeom prst="rect">
+            <a:avLst/>
+          </a:prstGeom>
+        </p:spPr>
+      </p:pic>
+      <p:pic>
+        <p:nvPicPr>
+          <p:cNvPr id="25" name="Image 24">
+            <a:extLst>
+              <a:ext uri="{FF2B5EF4-FFF2-40B4-BE49-F238E27FC236}">
+                <a16:creationId xmlns:a16="http://schemas.microsoft.com/office/drawing/2014/main" id="{62D5DF4F-EF92-401A-90F2-24BE3D4DA8E2}"/>
+              </a:ext>
+            </a:extLst>
+          </p:cNvPr>
+          <p:cNvPicPr>
+            <a:picLocks noChangeAspect="1"/>
+          </p:cNvPicPr>
+          <p:nvPr/>
+        </p:nvPicPr>
+        <p:blipFill>
+          <a:blip r:embed="rId4"/>
+          <a:stretch>
+            <a:fillRect/>
+          </a:stretch>
+        </p:blipFill>
+        <p:spPr>
+          <a:xfrm>
+            <a:off x="1009650" y="4729102"/>
+            <a:ext cx="7059010" cy="438211"/>
+          </a:xfrm>
+          <a:prstGeom prst="rect">
+            <a:avLst/>
+          </a:prstGeom>
+        </p:spPr>
+      </p:pic>
+      <p:sp>
+        <p:nvSpPr>
+          <p:cNvPr id="26" name="Rectangle 25">
+            <a:extLst>
+              <a:ext uri="{FF2B5EF4-FFF2-40B4-BE49-F238E27FC236}">
+                <a16:creationId xmlns:a16="http://schemas.microsoft.com/office/drawing/2014/main" id="{29ECBC2D-C9B2-4213-8668-EA4AD5A285FC}"/>
+              </a:ext>
+            </a:extLst>
+          </p:cNvPr>
+          <p:cNvSpPr/>
+          <p:nvPr/>
+        </p:nvSpPr>
+        <p:spPr>
+          <a:xfrm>
+            <a:off x="914398" y="2010908"/>
+            <a:ext cx="10648952" cy="646331"/>
+          </a:xfrm>
+          <a:prstGeom prst="rect">
+            <a:avLst/>
+          </a:prstGeom>
+        </p:spPr>
+        <p:txBody>
+          <a:bodyPr wrap="square">
+            <a:spAutoFit/>
+          </a:bodyPr>
+          <a:lstStyle/>
+          <a:p>
+            <a:r>
+              <a:rPr lang="fr-CA" dirty="0"/>
+              <a:t>Cette fonction démarre la communication avec l’ordinateur. Les valeurs de </a:t>
+            </a:r>
+            <a:r>
+              <a:rPr lang="fr-CA" b="1" dirty="0"/>
+              <a:t>baud</a:t>
+            </a:r>
+            <a:r>
+              <a:rPr lang="fr-CA" dirty="0"/>
+              <a:t> possibles : 300, 600, 1200, 2400, 4800, 9600, 14400, 19200, 28800, 38400, 57600, 115200 et +</a:t>
+            </a:r>
+          </a:p>
+        </p:txBody>
+      </p:sp>
+      <p:sp>
+        <p:nvSpPr>
+          <p:cNvPr id="35" name="Rectangle 34">
+            <a:extLst>
+              <a:ext uri="{FF2B5EF4-FFF2-40B4-BE49-F238E27FC236}">
+                <a16:creationId xmlns:a16="http://schemas.microsoft.com/office/drawing/2014/main" id="{AF0DD6E8-5FEA-4243-9569-9BE01B461D59}"/>
+              </a:ext>
+            </a:extLst>
+          </p:cNvPr>
+          <p:cNvSpPr/>
+          <p:nvPr/>
+        </p:nvSpPr>
+        <p:spPr>
+          <a:xfrm>
+            <a:off x="4601076" y="1414344"/>
+            <a:ext cx="2094115" cy="471482"/>
+          </a:xfrm>
+          <a:prstGeom prst="rect">
+            <a:avLst/>
+          </a:prstGeom>
+          <a:solidFill>
+            <a:schemeClr val="accent3"/>
+          </a:solidFill>
+          <a:ln>
+            <a:noFill/>
+          </a:ln>
+        </p:spPr>
+        <p:style>
+          <a:lnRef idx="2">
+            <a:schemeClr val="accent1">
+              <a:shade val="50000"/>
+            </a:schemeClr>
+          </a:lnRef>
+          <a:fillRef idx="1">
+            <a:schemeClr val="accent1"/>
+          </a:fillRef>
+          <a:effectRef idx="0">
+            <a:schemeClr val="accent1"/>
+          </a:effectRef>
+          <a:fontRef idx="minor">
+            <a:schemeClr val="lt1"/>
+          </a:fontRef>
+        </p:style>
+        <p:txBody>
+          <a:bodyPr rtlCol="0" anchor="ctr"/>
+          <a:lstStyle/>
+          <a:p>
+            <a:pPr algn="ctr"/>
+            <a:r>
+              <a:rPr lang="fr-CA" sz="3200" dirty="0">
+                <a:solidFill>
+                  <a:schemeClr val="tx1"/>
+                </a:solidFill>
+              </a:rPr>
+              <a:t>baud</a:t>
+            </a:r>
+          </a:p>
+        </p:txBody>
+      </p:sp>
+      <p:sp>
+        <p:nvSpPr>
+          <p:cNvPr id="36" name="Rectangle 35">
+            <a:extLst>
+              <a:ext uri="{FF2B5EF4-FFF2-40B4-BE49-F238E27FC236}">
+                <a16:creationId xmlns:a16="http://schemas.microsoft.com/office/drawing/2014/main" id="{DCCE8C16-28D1-4898-B717-4D329F5F176B}"/>
+              </a:ext>
+            </a:extLst>
+          </p:cNvPr>
+          <p:cNvSpPr/>
+          <p:nvPr/>
+        </p:nvSpPr>
+        <p:spPr>
+          <a:xfrm>
+            <a:off x="3706418" y="3083189"/>
+            <a:ext cx="3961207" cy="471482"/>
+          </a:xfrm>
+          <a:prstGeom prst="rect">
+            <a:avLst/>
+          </a:prstGeom>
+          <a:solidFill>
+            <a:schemeClr val="accent3"/>
+          </a:solidFill>
+          <a:ln>
+            <a:noFill/>
+          </a:ln>
+        </p:spPr>
+        <p:style>
+          <a:lnRef idx="2">
+            <a:schemeClr val="accent1">
+              <a:shade val="50000"/>
+            </a:schemeClr>
+          </a:lnRef>
+          <a:fillRef idx="1">
+            <a:schemeClr val="accent1"/>
+          </a:fillRef>
+          <a:effectRef idx="0">
+            <a:schemeClr val="accent1"/>
+          </a:effectRef>
+          <a:fontRef idx="minor">
+            <a:schemeClr val="lt1"/>
+          </a:fontRef>
+        </p:style>
+        <p:txBody>
+          <a:bodyPr rtlCol="0" anchor="ctr"/>
+          <a:lstStyle/>
+          <a:p>
+            <a:pPr algn="ctr"/>
+            <a:r>
+              <a:rPr lang="fr-CA" sz="3200" dirty="0">
+                <a:solidFill>
+                  <a:schemeClr val="tx1"/>
+                </a:solidFill>
+              </a:rPr>
+              <a:t>valeur à envoyer</a:t>
+            </a:r>
+          </a:p>
+        </p:txBody>
+      </p:sp>
+      <p:sp>
+        <p:nvSpPr>
+          <p:cNvPr id="37" name="Rectangle 36">
+            <a:extLst>
+              <a:ext uri="{FF2B5EF4-FFF2-40B4-BE49-F238E27FC236}">
+                <a16:creationId xmlns:a16="http://schemas.microsoft.com/office/drawing/2014/main" id="{1E8A71B8-65DF-4B08-B832-78DB03D591F3}"/>
+              </a:ext>
+            </a:extLst>
+          </p:cNvPr>
+          <p:cNvSpPr/>
+          <p:nvPr/>
+        </p:nvSpPr>
+        <p:spPr>
+          <a:xfrm>
+            <a:off x="4211243" y="4695831"/>
+            <a:ext cx="3456382" cy="471482"/>
+          </a:xfrm>
+          <a:prstGeom prst="rect">
+            <a:avLst/>
+          </a:prstGeom>
+          <a:solidFill>
+            <a:schemeClr val="accent3"/>
+          </a:solidFill>
+          <a:ln>
+            <a:noFill/>
+          </a:ln>
+        </p:spPr>
+        <p:style>
+          <a:lnRef idx="2">
+            <a:schemeClr val="accent1">
+              <a:shade val="50000"/>
+            </a:schemeClr>
+          </a:lnRef>
+          <a:fillRef idx="1">
+            <a:schemeClr val="accent1"/>
+          </a:fillRef>
+          <a:effectRef idx="0">
+            <a:schemeClr val="accent1"/>
+          </a:effectRef>
+          <a:fontRef idx="minor">
+            <a:schemeClr val="lt1"/>
+          </a:fontRef>
+        </p:style>
+        <p:txBody>
+          <a:bodyPr rtlCol="0" anchor="ctr"/>
+          <a:lstStyle/>
+          <a:p>
+            <a:pPr algn="ctr"/>
+            <a:r>
+              <a:rPr lang="fr-CA" sz="3200" dirty="0">
+                <a:solidFill>
+                  <a:schemeClr val="tx1"/>
+                </a:solidFill>
+              </a:rPr>
+              <a:t>valeur à imprimer</a:t>
+            </a:r>
+          </a:p>
+        </p:txBody>
+      </p:sp>
+      <p:sp>
+        <p:nvSpPr>
+          <p:cNvPr id="38" name="Rectangle 37">
+            <a:extLst>
+              <a:ext uri="{FF2B5EF4-FFF2-40B4-BE49-F238E27FC236}">
+                <a16:creationId xmlns:a16="http://schemas.microsoft.com/office/drawing/2014/main" id="{0A1A45C1-C6ED-473E-AEED-2129ED1CEA1F}"/>
+              </a:ext>
+            </a:extLst>
+          </p:cNvPr>
+          <p:cNvSpPr/>
+          <p:nvPr/>
+        </p:nvSpPr>
+        <p:spPr>
+          <a:xfrm>
+            <a:off x="914398" y="3625662"/>
+            <a:ext cx="10648952" cy="369332"/>
+          </a:xfrm>
+          <a:prstGeom prst="rect">
+            <a:avLst/>
+          </a:prstGeom>
+        </p:spPr>
+        <p:txBody>
+          <a:bodyPr wrap="square">
+            <a:spAutoFit/>
+          </a:bodyPr>
+          <a:lstStyle/>
+          <a:p>
+            <a:r>
+              <a:rPr lang="fr-CA" dirty="0"/>
+              <a:t>Envoie à l’ordinateur une valeur en mode texte.</a:t>
+            </a:r>
+          </a:p>
+        </p:txBody>
+      </p:sp>
+      <p:sp>
+        <p:nvSpPr>
+          <p:cNvPr id="39" name="Rectangle 38">
+            <a:extLst>
+              <a:ext uri="{FF2B5EF4-FFF2-40B4-BE49-F238E27FC236}">
+                <a16:creationId xmlns:a16="http://schemas.microsoft.com/office/drawing/2014/main" id="{AD5C3158-B106-4F9A-9755-3024C2CF7630}"/>
+              </a:ext>
+            </a:extLst>
+          </p:cNvPr>
+          <p:cNvSpPr/>
+          <p:nvPr/>
+        </p:nvSpPr>
+        <p:spPr>
+          <a:xfrm>
+            <a:off x="914398" y="5161807"/>
+            <a:ext cx="10648952" cy="369332"/>
+          </a:xfrm>
+          <a:prstGeom prst="rect">
+            <a:avLst/>
+          </a:prstGeom>
+        </p:spPr>
+        <p:txBody>
+          <a:bodyPr wrap="square">
+            <a:spAutoFit/>
+          </a:bodyPr>
+          <a:lstStyle/>
+          <a:p>
+            <a:r>
+              <a:rPr lang="fr-CA" dirty="0"/>
+              <a:t>Envoie à l’ordinateur une valeur en mode texte, suivi d’un retour à la ligne (ln).</a:t>
+            </a:r>
+          </a:p>
+        </p:txBody>
+      </p:sp>
+    </p:spTree>
+    <p:extLst>
+      <p:ext uri="{BB962C8B-B14F-4D97-AF65-F5344CB8AC3E}">
+        <p14:creationId xmlns:p14="http://schemas.microsoft.com/office/powerpoint/2010/main" val="3292424376"/>
+      </p:ext>
+    </p:extLst>
+  </p:cSld>
+  <p:clrMapOvr>
+    <a:masterClrMapping/>
+  </p:clrMapOvr>
+</p:sld>
+</file>
+
 <file path=ppt/slides/slide3.xml><?xml version="1.0" encoding="utf-8"?>
 <p:sld xmlns:a="http://schemas.openxmlformats.org/drawingml/2006/main" xmlns:r="http://schemas.openxmlformats.org/officeDocument/2006/relationships" xmlns:p="http://schemas.openxmlformats.org/presentationml/2006/main">
   <p:cSld>
@@ -5286,15 +4544,7 @@
           <a:p>
             <a:r>
               <a:rPr lang="fr-CA" sz="2400" dirty="0"/>
-              <a:t>RECEVOIR DES DONNÉES SÉRIELLES DANS </a:t>
-            </a:r>
-            <a:r>
-              <a:rPr lang="fr-CA" sz="2400" dirty="0">
-                <a:solidFill>
-                  <a:schemeClr val="accent6"/>
-                </a:solidFill>
-              </a:rPr>
-              <a:t>ARDUINO</a:t>
+              <a:t>ENVOYER DES MESSAGES À PARTIR D’ARDUINO</a:t>
             </a:r>
           </a:p>
         </p:txBody>
@@ -5321,7 +4571,7 @@
         </p:blipFill>
         <p:spPr>
           <a:xfrm>
-            <a:off x="933452" y="1111241"/>
+            <a:off x="1009650" y="1099856"/>
             <a:ext cx="7097115" cy="390580"/>
           </a:xfrm>
           <a:prstGeom prst="rect">
@@ -5329,48 +4579,66 @@
           </a:prstGeom>
         </p:spPr>
       </p:pic>
-      <p:sp>
-        <p:nvSpPr>
-          <p:cNvPr id="26" name="Rectangle 25">
-            <a:extLst>
-              <a:ext uri="{FF2B5EF4-FFF2-40B4-BE49-F238E27FC236}">
-                <a16:creationId xmlns:a16="http://schemas.microsoft.com/office/drawing/2014/main" id="{29ECBC2D-C9B2-4213-8668-EA4AD5A285FC}"/>
-              </a:ext>
-            </a:extLst>
-          </p:cNvPr>
-          <p:cNvSpPr/>
+      <p:pic>
+        <p:nvPicPr>
+          <p:cNvPr id="24" name="Image 23">
+            <a:extLst>
+              <a:ext uri="{FF2B5EF4-FFF2-40B4-BE49-F238E27FC236}">
+                <a16:creationId xmlns:a16="http://schemas.microsoft.com/office/drawing/2014/main" id="{003CB199-AC20-4FAF-A153-4203C55FE78A}"/>
+              </a:ext>
+            </a:extLst>
+          </p:cNvPr>
+          <p:cNvPicPr>
+            <a:picLocks noChangeAspect="1"/>
+          </p:cNvPicPr>
           <p:nvPr/>
-        </p:nvSpPr>
-        <p:spPr>
-          <a:xfrm>
-            <a:off x="838200" y="1481903"/>
-            <a:ext cx="10648952" cy="646331"/>
+        </p:nvPicPr>
+        <p:blipFill>
+          <a:blip r:embed="rId3"/>
+          <a:stretch>
+            <a:fillRect/>
+          </a:stretch>
+        </p:blipFill>
+        <p:spPr>
+          <a:xfrm>
+            <a:off x="1034201" y="2271430"/>
+            <a:ext cx="7182852" cy="390580"/>
           </a:xfrm>
           <a:prstGeom prst="rect">
             <a:avLst/>
           </a:prstGeom>
         </p:spPr>
-        <p:txBody>
-          <a:bodyPr wrap="square">
-            <a:spAutoFit/>
-          </a:bodyPr>
-          <a:lstStyle/>
-          <a:p>
-            <a:r>
-              <a:rPr lang="fr-CA" dirty="0"/>
-              <a:t>Cette fonction démarre la communication avec l’ordinateur. Les valeurs de </a:t>
-            </a:r>
-            <a:r>
-              <a:rPr lang="fr-CA" b="1" dirty="0"/>
-              <a:t>baud</a:t>
-            </a:r>
-            <a:r>
-              <a:rPr lang="fr-CA" dirty="0"/>
-              <a:t> possibles : 300, 600, 1200, 2400, 4800, 9600, 14400, 19200, 28800, 38400, 57600, 115200 et +</a:t>
-            </a:r>
-          </a:p>
-        </p:txBody>
-      </p:sp>
+      </p:pic>
+      <p:pic>
+        <p:nvPicPr>
+          <p:cNvPr id="25" name="Image 24">
+            <a:extLst>
+              <a:ext uri="{FF2B5EF4-FFF2-40B4-BE49-F238E27FC236}">
+                <a16:creationId xmlns:a16="http://schemas.microsoft.com/office/drawing/2014/main" id="{62D5DF4F-EF92-401A-90F2-24BE3D4DA8E2}"/>
+              </a:ext>
+            </a:extLst>
+          </p:cNvPr>
+          <p:cNvPicPr>
+            <a:picLocks noChangeAspect="1"/>
+          </p:cNvPicPr>
+          <p:nvPr/>
+        </p:nvPicPr>
+        <p:blipFill>
+          <a:blip r:embed="rId4"/>
+          <a:stretch>
+            <a:fillRect/>
+          </a:stretch>
+        </p:blipFill>
+        <p:spPr>
+          <a:xfrm>
+            <a:off x="914398" y="5802023"/>
+            <a:ext cx="7059010" cy="438211"/>
+          </a:xfrm>
+          <a:prstGeom prst="rect">
+            <a:avLst/>
+          </a:prstGeom>
+        </p:spPr>
+      </p:pic>
       <p:sp>
         <p:nvSpPr>
           <p:cNvPr id="35" name="Rectangle 34">
@@ -5385,7 +4653,7 @@
         </p:nvSpPr>
         <p:spPr>
           <a:xfrm>
-            <a:off x="4524878" y="1066800"/>
+            <a:off x="4601076" y="1055415"/>
             <a:ext cx="2094115" cy="471482"/>
           </a:xfrm>
           <a:prstGeom prst="rect">
@@ -5432,10 +4700,10 @@
       </p:sp>
       <p:sp>
         <p:nvSpPr>
-          <p:cNvPr id="37" name="Rectangle 36">
-            <a:extLst>
-              <a:ext uri="{FF2B5EF4-FFF2-40B4-BE49-F238E27FC236}">
-                <a16:creationId xmlns:a16="http://schemas.microsoft.com/office/drawing/2014/main" id="{1E8A71B8-65DF-4B08-B832-78DB03D591F3}"/>
+          <p:cNvPr id="36" name="Rectangle 35">
+            <a:extLst>
+              <a:ext uri="{FF2B5EF4-FFF2-40B4-BE49-F238E27FC236}">
+                <a16:creationId xmlns:a16="http://schemas.microsoft.com/office/drawing/2014/main" id="{DCCE8C16-28D1-4898-B717-4D329F5F176B}"/>
               </a:ext>
             </a:extLst>
           </p:cNvPr>
@@ -5444,8 +4712,8 @@
         </p:nvSpPr>
         <p:spPr>
           <a:xfrm>
-            <a:off x="933453" y="3251090"/>
-            <a:ext cx="1480256" cy="471482"/>
+            <a:off x="3730969" y="2190528"/>
+            <a:ext cx="3961207" cy="471482"/>
           </a:xfrm>
           <a:prstGeom prst="rect">
             <a:avLst/>
@@ -5479,30 +4747,22 @@
           <a:p>
             <a:pPr algn="ctr"/>
             <a:r>
-              <a:rPr lang="fr-CA" sz="3200" dirty="0" err="1">
-                <a:solidFill>
-                  <a:schemeClr val="tx1"/>
-                </a:solidFill>
-              </a:rPr>
-              <a:t>int</a:t>
-            </a:r>
-            <a:r>
               <a:rPr lang="fr-CA" sz="3200" dirty="0">
                 <a:solidFill>
                   <a:schemeClr val="tx1"/>
                 </a:solidFill>
               </a:rPr>
-              <a:t> data</a:t>
-            </a:r>
-          </a:p>
-        </p:txBody>
-      </p:sp>
-      <p:sp>
-        <p:nvSpPr>
-          <p:cNvPr id="39" name="Rectangle 38">
-            <a:extLst>
-              <a:ext uri="{FF2B5EF4-FFF2-40B4-BE49-F238E27FC236}">
-                <a16:creationId xmlns:a16="http://schemas.microsoft.com/office/drawing/2014/main" id="{AD5C3158-B106-4F9A-9755-3024C2CF7630}"/>
+              <a:t>valeur à envoyer</a:t>
+            </a:r>
+          </a:p>
+        </p:txBody>
+      </p:sp>
+      <p:sp>
+        <p:nvSpPr>
+          <p:cNvPr id="37" name="Rectangle 36">
+            <a:extLst>
+              <a:ext uri="{FF2B5EF4-FFF2-40B4-BE49-F238E27FC236}">
+                <a16:creationId xmlns:a16="http://schemas.microsoft.com/office/drawing/2014/main" id="{1E8A71B8-65DF-4B08-B832-78DB03D591F3}"/>
               </a:ext>
             </a:extLst>
           </p:cNvPr>
@@ -5511,12 +4771,71 @@
         </p:nvSpPr>
         <p:spPr>
           <a:xfrm>
-            <a:off x="933453" y="3722572"/>
-            <a:ext cx="10648952" cy="369332"/>
+            <a:off x="4211243" y="5763840"/>
+            <a:ext cx="3456382" cy="471482"/>
           </a:xfrm>
           <a:prstGeom prst="rect">
             <a:avLst/>
           </a:prstGeom>
+          <a:solidFill>
+            <a:schemeClr val="accent3"/>
+          </a:solidFill>
+          <a:ln>
+            <a:noFill/>
+          </a:ln>
+        </p:spPr>
+        <p:style>
+          <a:lnRef idx="2">
+            <a:schemeClr val="accent1">
+              <a:shade val="50000"/>
+            </a:schemeClr>
+          </a:lnRef>
+          <a:fillRef idx="1">
+            <a:schemeClr val="accent1"/>
+          </a:fillRef>
+          <a:effectRef idx="0">
+            <a:schemeClr val="accent1"/>
+          </a:effectRef>
+          <a:fontRef idx="minor">
+            <a:schemeClr val="lt1"/>
+          </a:fontRef>
+        </p:style>
+        <p:txBody>
+          <a:bodyPr rtlCol="0" anchor="ctr"/>
+          <a:lstStyle/>
+          <a:p>
+            <a:pPr algn="ctr"/>
+            <a:r>
+              <a:rPr lang="fr-CA" sz="3200" dirty="0">
+                <a:solidFill>
+                  <a:schemeClr val="tx1"/>
+                </a:solidFill>
+              </a:rPr>
+              <a:t>valeur à imprimer</a:t>
+            </a:r>
+          </a:p>
+        </p:txBody>
+      </p:sp>
+      <p:sp>
+        <p:nvSpPr>
+          <p:cNvPr id="38" name="Rectangle 37">
+            <a:extLst>
+              <a:ext uri="{FF2B5EF4-FFF2-40B4-BE49-F238E27FC236}">
+                <a16:creationId xmlns:a16="http://schemas.microsoft.com/office/drawing/2014/main" id="{0A1A45C1-C6ED-473E-AEED-2129ED1CEA1F}"/>
+              </a:ext>
+            </a:extLst>
+          </p:cNvPr>
+          <p:cNvSpPr/>
+          <p:nvPr/>
+        </p:nvSpPr>
+        <p:spPr>
+          <a:xfrm>
+            <a:off x="938949" y="2628197"/>
+            <a:ext cx="10648952" cy="369332"/>
+          </a:xfrm>
+          <a:prstGeom prst="rect">
+            <a:avLst/>
+          </a:prstGeom>
         </p:spPr>
         <p:txBody>
           <a:bodyPr wrap="square">
@@ -5526,17 +4845,59 @@
           <a:p>
             <a:r>
               <a:rPr lang="fr-CA" dirty="0"/>
-              <a:t>Retourne une seule donnée reçue (la plus ancienne et ensuite l’efface).</a:t>
+              <a:t>Envoyer à l’ordinateur une valeur en mode texte.</a:t>
+            </a:r>
+          </a:p>
+        </p:txBody>
+      </p:sp>
+      <p:sp>
+        <p:nvSpPr>
+          <p:cNvPr id="39" name="Rectangle 38">
+            <a:extLst>
+              <a:ext uri="{FF2B5EF4-FFF2-40B4-BE49-F238E27FC236}">
+                <a16:creationId xmlns:a16="http://schemas.microsoft.com/office/drawing/2014/main" id="{AD5C3158-B106-4F9A-9755-3024C2CF7630}"/>
+              </a:ext>
+            </a:extLst>
+          </p:cNvPr>
+          <p:cNvSpPr/>
+          <p:nvPr/>
+        </p:nvSpPr>
+        <p:spPr>
+          <a:xfrm>
+            <a:off x="864817" y="6144968"/>
+            <a:ext cx="10648952" cy="369332"/>
+          </a:xfrm>
+          <a:prstGeom prst="rect">
+            <a:avLst/>
+          </a:prstGeom>
+        </p:spPr>
+        <p:txBody>
+          <a:bodyPr wrap="square">
+            <a:spAutoFit/>
+          </a:bodyPr>
+          <a:lstStyle/>
+          <a:p>
+            <a:r>
+              <a:rPr lang="fr-CA" dirty="0"/>
+              <a:t>Envoyer à l’ordinateur une valeur en mode texte, suivi l’ordinateur un retour à la ligne (ln) et un retour de chariot (</a:t>
+            </a:r>
+            <a:r>
+              <a:rPr lang="fr-CA" dirty="0" err="1"/>
+              <a:t>cr</a:t>
+            </a:r>
+            <a:r>
+              <a:rPr lang="fr-CA" dirty="0"/>
+              <a:t>).</a:t>
             </a:r>
           </a:p>
         </p:txBody>
       </p:sp>
       <p:pic>
         <p:nvPicPr>
-          <p:cNvPr id="3" name="Image 2">
-            <a:extLst>
-              <a:ext uri="{FF2B5EF4-FFF2-40B4-BE49-F238E27FC236}">
-                <a16:creationId xmlns:a16="http://schemas.microsoft.com/office/drawing/2014/main" id="{D0AF15CA-9D19-4529-AA11-F297E226BF23}"/>
+          <p:cNvPr id="12" name="Image 11">
+            <a:extLst>
+              <a:ext uri="{FF2B5EF4-FFF2-40B4-BE49-F238E27FC236}">
+                <a16:creationId xmlns:a16="http://schemas.microsoft.com/office/drawing/2014/main" id="{34300FA1-F18C-4935-90C5-0B7A4C111AC0}"/>
               </a:ext>
             </a:extLst>
           </p:cNvPr>
@@ -5545,28 +4906,120 @@
           </p:cNvPicPr>
           <p:nvPr/>
         </p:nvPicPr>
-        <p:blipFill>
+        <p:blipFill rotWithShape="1">
           <a:blip r:embed="rId3"/>
-          <a:stretch>
-            <a:fillRect/>
-          </a:stretch>
+          <a:srcRect r="62924"/>
+          <a:stretch/>
         </p:blipFill>
         <p:spPr>
           <a:xfrm>
-            <a:off x="933453" y="2273549"/>
-            <a:ext cx="3656354" cy="491791"/>
+            <a:off x="1042747" y="3129969"/>
+            <a:ext cx="2663115" cy="390580"/>
           </a:xfrm>
           <a:prstGeom prst="rect">
             <a:avLst/>
           </a:prstGeom>
         </p:spPr>
       </p:pic>
+      <p:sp>
+        <p:nvSpPr>
+          <p:cNvPr id="13" name="Rectangle 12">
+            <a:extLst>
+              <a:ext uri="{FF2B5EF4-FFF2-40B4-BE49-F238E27FC236}">
+                <a16:creationId xmlns:a16="http://schemas.microsoft.com/office/drawing/2014/main" id="{1ADCC9A1-73F5-469B-B921-DD342EDC178B}"/>
+              </a:ext>
+            </a:extLst>
+          </p:cNvPr>
+          <p:cNvSpPr/>
+          <p:nvPr/>
+        </p:nvSpPr>
+        <p:spPr>
+          <a:xfrm>
+            <a:off x="3730969" y="3042086"/>
+            <a:ext cx="2663115" cy="471482"/>
+          </a:xfrm>
+          <a:prstGeom prst="rect">
+            <a:avLst/>
+          </a:prstGeom>
+          <a:solidFill>
+            <a:schemeClr val="accent3"/>
+          </a:solidFill>
+          <a:ln>
+            <a:noFill/>
+          </a:ln>
+        </p:spPr>
+        <p:style>
+          <a:lnRef idx="2">
+            <a:schemeClr val="accent1">
+              <a:shade val="50000"/>
+            </a:schemeClr>
+          </a:lnRef>
+          <a:fillRef idx="1">
+            <a:schemeClr val="accent1"/>
+          </a:fillRef>
+          <a:effectRef idx="0">
+            <a:schemeClr val="accent1"/>
+          </a:effectRef>
+          <a:fontRef idx="minor">
+            <a:schemeClr val="lt1"/>
+          </a:fontRef>
+        </p:style>
+        <p:txBody>
+          <a:bodyPr rtlCol="0" anchor="ctr"/>
+          <a:lstStyle/>
+          <a:p>
+            <a:pPr algn="ctr"/>
+            <a:r>
+              <a:rPr lang="fr-CA" sz="3200" dirty="0">
+                <a:solidFill>
+                  <a:schemeClr val="tx1"/>
+                </a:solidFill>
+              </a:rPr>
+              <a:t>texte à envoyer</a:t>
+            </a:r>
+          </a:p>
+        </p:txBody>
+      </p:sp>
+      <p:sp>
+        <p:nvSpPr>
+          <p:cNvPr id="14" name="Rectangle 13">
+            <a:extLst>
+              <a:ext uri="{FF2B5EF4-FFF2-40B4-BE49-F238E27FC236}">
+                <a16:creationId xmlns:a16="http://schemas.microsoft.com/office/drawing/2014/main" id="{C01A2274-2F80-419F-AAE0-D3132ECE57FB}"/>
+              </a:ext>
+            </a:extLst>
+          </p:cNvPr>
+          <p:cNvSpPr/>
+          <p:nvPr/>
+        </p:nvSpPr>
+        <p:spPr>
+          <a:xfrm>
+            <a:off x="947495" y="3523029"/>
+            <a:ext cx="10648952" cy="369332"/>
+          </a:xfrm>
+          <a:prstGeom prst="rect">
+            <a:avLst/>
+          </a:prstGeom>
+        </p:spPr>
+        <p:txBody>
+          <a:bodyPr wrap="square">
+            <a:spAutoFit/>
+          </a:bodyPr>
+          <a:lstStyle/>
+          <a:p>
+            <a:r>
+              <a:rPr lang="fr-CA" dirty="0"/>
+              <a:t>Envoyer à l’ordinateur du texte.</a:t>
+            </a:r>
+          </a:p>
+        </p:txBody>
+      </p:sp>
       <p:pic>
         <p:nvPicPr>
-          <p:cNvPr id="4" name="Image 3">
-            <a:extLst>
-              <a:ext uri="{FF2B5EF4-FFF2-40B4-BE49-F238E27FC236}">
-                <a16:creationId xmlns:a16="http://schemas.microsoft.com/office/drawing/2014/main" id="{4E72FCF2-F9E4-405C-B39C-E6AA1AC47726}"/>
+          <p:cNvPr id="15" name="Image 14">
+            <a:extLst>
+              <a:ext uri="{FF2B5EF4-FFF2-40B4-BE49-F238E27FC236}">
+                <a16:creationId xmlns:a16="http://schemas.microsoft.com/office/drawing/2014/main" id="{BA7DB3AF-15BB-4997-81CA-DE0DDB353E54}"/>
               </a:ext>
             </a:extLst>
           </p:cNvPr>
@@ -5575,16 +5028,15 @@
           </p:cNvPicPr>
           <p:nvPr/>
         </p:nvPicPr>
-        <p:blipFill>
+        <p:blipFill rotWithShape="1">
           <a:blip r:embed="rId4"/>
-          <a:stretch>
-            <a:fillRect/>
-          </a:stretch>
+          <a:srcRect r="56203"/>
+          <a:stretch/>
         </p:blipFill>
         <p:spPr>
           <a:xfrm>
-            <a:off x="2494590" y="3224048"/>
-            <a:ext cx="3307367" cy="525826"/>
+            <a:off x="933452" y="4994815"/>
+            <a:ext cx="3091617" cy="438211"/>
           </a:xfrm>
           <a:prstGeom prst="rect">
             <a:avLst/>
@@ -5593,10 +5045,10 @@
       </p:pic>
       <p:sp>
         <p:nvSpPr>
-          <p:cNvPr id="38" name="Rectangle 37">
-            <a:extLst>
-              <a:ext uri="{FF2B5EF4-FFF2-40B4-BE49-F238E27FC236}">
-                <a16:creationId xmlns:a16="http://schemas.microsoft.com/office/drawing/2014/main" id="{0A1A45C1-C6ED-473E-AEED-2129ED1CEA1F}"/>
+          <p:cNvPr id="17" name="Rectangle 16">
+            <a:extLst>
+              <a:ext uri="{FF2B5EF4-FFF2-40B4-BE49-F238E27FC236}">
+                <a16:creationId xmlns:a16="http://schemas.microsoft.com/office/drawing/2014/main" id="{778CDE14-5537-4CC0-AF1F-878CC7943659}"/>
               </a:ext>
             </a:extLst>
           </p:cNvPr>
@@ -5605,7 +5057,7 @@
         </p:nvSpPr>
         <p:spPr>
           <a:xfrm>
-            <a:off x="838200" y="2716134"/>
+            <a:off x="914398" y="5342669"/>
             <a:ext cx="10648952" cy="369332"/>
           </a:xfrm>
           <a:prstGeom prst="rect">
@@ -5613,48 +5065,51 @@
           </a:prstGeom>
         </p:spPr>
         <p:txBody>
-          <a:bodyPr wrap="square">
+          <a:bodyPr wrap="square" lIns="91440" tIns="45720" rIns="91440" bIns="45720" anchor="t">
             <a:spAutoFit/>
           </a:bodyPr>
           <a:lstStyle/>
           <a:p>
             <a:r>
+              <a:rPr lang="fr-CA" dirty="0"/>
+              <a:t>Envoyer à l’ordinateur un retour à la ligne (</a:t>
+            </a:r>
+            <a:r>
               <a:rPr lang="fr-CA" dirty="0" err="1"/>
-              <a:t>Serial.available</a:t>
+              <a:t>lf</a:t>
             </a:r>
             <a:r>
               <a:rPr lang="fr-CA" dirty="0"/>
-              <a:t>() retourne </a:t>
-            </a:r>
-            <a:r>
-              <a:rPr lang="fr-CA" i="1" dirty="0"/>
-              <a:t>false</a:t>
+              <a:t>) et un retour de chariot (</a:t>
+            </a:r>
+            <a:r>
+              <a:rPr lang="fr-CA" dirty="0" err="1"/>
+              <a:t>cr</a:t>
             </a:r>
             <a:r>
               <a:rPr lang="fr-CA" dirty="0"/>
-              <a:t> s’il n’y a pas de données ou </a:t>
-            </a:r>
-            <a:r>
-              <a:rPr lang="fr-CA" i="1" dirty="0" err="1"/>
-              <a:t>true</a:t>
-            </a:r>
-            <a:r>
-              <a:rPr lang="fr-CA" i="1" dirty="0"/>
-              <a:t> </a:t>
-            </a:r>
-            <a:r>
-              <a:rPr lang="fr-CA" dirty="0"/>
-              <a:t>s’il y en a. </a:t>
+              <a:t>). </a:t>
+            </a:r>
+            <a:r>
+              <a:rPr lang="fr-CA" b="1" dirty="0">
+                <a:solidFill>
+                  <a:schemeClr val="bg1"/>
+                </a:solidFill>
+                <a:highlight>
+                  <a:srgbClr val="FF0000"/>
+                </a:highlight>
+              </a:rPr>
+              <a:t>Permet de terminer le message.</a:t>
             </a:r>
           </a:p>
         </p:txBody>
       </p:sp>
       <p:pic>
         <p:nvPicPr>
-          <p:cNvPr id="6" name="Image 5">
-            <a:extLst>
-              <a:ext uri="{FF2B5EF4-FFF2-40B4-BE49-F238E27FC236}">
-                <a16:creationId xmlns:a16="http://schemas.microsoft.com/office/drawing/2014/main" id="{2CDC7048-0BE0-4C1D-A9D0-28F2E87B09B8}"/>
+          <p:cNvPr id="18" name="Image 17">
+            <a:extLst>
+              <a:ext uri="{FF2B5EF4-FFF2-40B4-BE49-F238E27FC236}">
+                <a16:creationId xmlns:a16="http://schemas.microsoft.com/office/drawing/2014/main" id="{0B87A24F-FDEF-44B7-8D55-A6648CCF0FB1}"/>
               </a:ext>
             </a:extLst>
           </p:cNvPr>
@@ -5663,33 +5118,27 @@
           </p:cNvPicPr>
           <p:nvPr/>
         </p:nvPicPr>
-        <p:blipFill>
-          <a:blip r:embed="rId5"/>
-          <a:stretch>
-            <a:fillRect/>
-          </a:stretch>
+        <p:blipFill rotWithShape="1">
+          <a:blip r:embed="rId4"/>
+          <a:srcRect l="96842"/>
+          <a:stretch/>
         </p:blipFill>
         <p:spPr>
           <a:xfrm>
-            <a:off x="4956560" y="4596861"/>
-            <a:ext cx="6180356" cy="1806097"/>
+            <a:off x="3913613" y="5052962"/>
+            <a:ext cx="222911" cy="438211"/>
           </a:xfrm>
           <a:prstGeom prst="rect">
             <a:avLst/>
           </a:prstGeom>
-          <a:ln>
-            <a:solidFill>
-              <a:schemeClr val="accent6"/>
-            </a:solidFill>
-          </a:ln>
         </p:spPr>
       </p:pic>
       <p:sp>
         <p:nvSpPr>
-          <p:cNvPr id="16" name="Rectangle 15">
-            <a:extLst>
-              <a:ext uri="{FF2B5EF4-FFF2-40B4-BE49-F238E27FC236}">
-                <a16:creationId xmlns:a16="http://schemas.microsoft.com/office/drawing/2014/main" id="{F1C7FFE2-1359-40A8-B565-1EFBD0361C29}"/>
+          <p:cNvPr id="22" name="Rectangle 21">
+            <a:extLst>
+              <a:ext uri="{FF2B5EF4-FFF2-40B4-BE49-F238E27FC236}">
+                <a16:creationId xmlns:a16="http://schemas.microsoft.com/office/drawing/2014/main" id="{70B19C9E-1EE9-4FE6-ACEB-72C92C1001EB}"/>
               </a:ext>
             </a:extLst>
           </p:cNvPr>
@@ -5698,8 +5147,8 @@
         </p:nvSpPr>
         <p:spPr>
           <a:xfrm>
-            <a:off x="933452" y="4914432"/>
-            <a:ext cx="4023108" cy="923330"/>
+            <a:off x="933452" y="1496942"/>
+            <a:ext cx="10648952" cy="369332"/>
           </a:xfrm>
           <a:prstGeom prst="rect">
             <a:avLst/>
@@ -5711,18 +5160,522 @@
           </a:bodyPr>
           <a:lstStyle/>
           <a:p>
-            <a:pPr algn="r"/>
             <a:r>
               <a:rPr lang="fr-CA" dirty="0"/>
-              <a:t>Nous utilisons habituellement ce block de code pour faire la lecture des données, une par une à mesure qu’elles sont reçues.</a:t>
-            </a:r>
-          </a:p>
-        </p:txBody>
-      </p:sp>
+              <a:t>Initialiser la communication à une certaine vitesse. Voir la diapositive suivante à propos des vitesses de baud.</a:t>
+            </a:r>
+          </a:p>
+        </p:txBody>
+      </p:sp>
+      <p:sp>
+        <p:nvSpPr>
+          <p:cNvPr id="23" name="Rectangle 22">
+            <a:extLst>
+              <a:ext uri="{FF2B5EF4-FFF2-40B4-BE49-F238E27FC236}">
+                <a16:creationId xmlns:a16="http://schemas.microsoft.com/office/drawing/2014/main" id="{4CC5E0FA-373B-42C8-AA5C-7A50BE0A6A8E}"/>
+              </a:ext>
+            </a:extLst>
+          </p:cNvPr>
+          <p:cNvSpPr/>
+          <p:nvPr/>
+        </p:nvSpPr>
+        <p:spPr>
+          <a:xfrm>
+            <a:off x="3448449" y="2966018"/>
+            <a:ext cx="398030" cy="471482"/>
+          </a:xfrm>
+          <a:prstGeom prst="rect">
+            <a:avLst/>
+          </a:prstGeom>
+          <a:noFill/>
+          <a:ln>
+            <a:noFill/>
+          </a:ln>
+        </p:spPr>
+        <p:style>
+          <a:lnRef idx="2">
+            <a:schemeClr val="accent1">
+              <a:shade val="50000"/>
+            </a:schemeClr>
+          </a:lnRef>
+          <a:fillRef idx="1">
+            <a:schemeClr val="accent1"/>
+          </a:fillRef>
+          <a:effectRef idx="0">
+            <a:schemeClr val="accent1"/>
+          </a:effectRef>
+          <a:fontRef idx="minor">
+            <a:schemeClr val="lt1"/>
+          </a:fontRef>
+        </p:style>
+        <p:txBody>
+          <a:bodyPr rtlCol="0" anchor="ctr"/>
+          <a:lstStyle/>
+          <a:p>
+            <a:pPr algn="ctr"/>
+            <a:r>
+              <a:rPr lang="fr-CA" sz="3200" dirty="0">
+                <a:solidFill>
+                  <a:schemeClr val="tx1"/>
+                </a:solidFill>
+              </a:rPr>
+              <a:t>"</a:t>
+            </a:r>
+          </a:p>
+        </p:txBody>
+      </p:sp>
+      <p:sp>
+        <p:nvSpPr>
+          <p:cNvPr id="27" name="Rectangle 26">
+            <a:extLst>
+              <a:ext uri="{FF2B5EF4-FFF2-40B4-BE49-F238E27FC236}">
+                <a16:creationId xmlns:a16="http://schemas.microsoft.com/office/drawing/2014/main" id="{FF2667FF-D333-4E55-B402-5DB57CD214FE}"/>
+              </a:ext>
+            </a:extLst>
+          </p:cNvPr>
+          <p:cNvSpPr/>
+          <p:nvPr/>
+        </p:nvSpPr>
+        <p:spPr>
+          <a:xfrm>
+            <a:off x="6263425" y="2964721"/>
+            <a:ext cx="398030" cy="471482"/>
+          </a:xfrm>
+          <a:prstGeom prst="rect">
+            <a:avLst/>
+          </a:prstGeom>
+          <a:noFill/>
+          <a:ln>
+            <a:noFill/>
+          </a:ln>
+        </p:spPr>
+        <p:style>
+          <a:lnRef idx="2">
+            <a:schemeClr val="accent1">
+              <a:shade val="50000"/>
+            </a:schemeClr>
+          </a:lnRef>
+          <a:fillRef idx="1">
+            <a:schemeClr val="accent1"/>
+          </a:fillRef>
+          <a:effectRef idx="0">
+            <a:schemeClr val="accent1"/>
+          </a:effectRef>
+          <a:fontRef idx="minor">
+            <a:schemeClr val="lt1"/>
+          </a:fontRef>
+        </p:style>
+        <p:txBody>
+          <a:bodyPr rtlCol="0" anchor="ctr"/>
+          <a:lstStyle/>
+          <a:p>
+            <a:pPr algn="ctr"/>
+            <a:r>
+              <a:rPr lang="fr-CA" sz="3200" dirty="0">
+                <a:solidFill>
+                  <a:schemeClr val="tx1"/>
+                </a:solidFill>
+              </a:rPr>
+              <a:t>"</a:t>
+            </a:r>
+          </a:p>
+        </p:txBody>
+      </p:sp>
+      <p:pic>
+        <p:nvPicPr>
+          <p:cNvPr id="28" name="Image 27">
+            <a:extLst>
+              <a:ext uri="{FF2B5EF4-FFF2-40B4-BE49-F238E27FC236}">
+                <a16:creationId xmlns:a16="http://schemas.microsoft.com/office/drawing/2014/main" id="{9FC6F654-67E4-47FB-9635-713C12925D80}"/>
+              </a:ext>
+            </a:extLst>
+          </p:cNvPr>
+          <p:cNvPicPr>
+            <a:picLocks noChangeAspect="1"/>
+          </p:cNvPicPr>
+          <p:nvPr/>
+        </p:nvPicPr>
+        <p:blipFill rotWithShape="1">
+          <a:blip r:embed="rId4"/>
+          <a:srcRect l="96842"/>
+          <a:stretch/>
+        </p:blipFill>
+        <p:spPr>
+          <a:xfrm>
+            <a:off x="6512089" y="3087925"/>
+            <a:ext cx="222911" cy="438211"/>
+          </a:xfrm>
+          <a:prstGeom prst="rect">
+            <a:avLst/>
+          </a:prstGeom>
+        </p:spPr>
+      </p:pic>
+      <p:pic>
+        <p:nvPicPr>
+          <p:cNvPr id="29" name="Image 28">
+            <a:extLst>
+              <a:ext uri="{FF2B5EF4-FFF2-40B4-BE49-F238E27FC236}">
+                <a16:creationId xmlns:a16="http://schemas.microsoft.com/office/drawing/2014/main" id="{F56787CC-707F-481B-A62E-2D728D136EFC}"/>
+              </a:ext>
+            </a:extLst>
+          </p:cNvPr>
+          <p:cNvPicPr>
+            <a:picLocks noChangeAspect="1"/>
+          </p:cNvPicPr>
+          <p:nvPr/>
+        </p:nvPicPr>
+        <p:blipFill rotWithShape="1">
+          <a:blip r:embed="rId3"/>
+          <a:srcRect r="62924"/>
+          <a:stretch/>
+        </p:blipFill>
+        <p:spPr>
+          <a:xfrm>
+            <a:off x="1042747" y="3932006"/>
+            <a:ext cx="2663115" cy="390580"/>
+          </a:xfrm>
+          <a:prstGeom prst="rect">
+            <a:avLst/>
+          </a:prstGeom>
+        </p:spPr>
+      </p:pic>
+      <p:sp>
+        <p:nvSpPr>
+          <p:cNvPr id="30" name="Rectangle 29">
+            <a:extLst>
+              <a:ext uri="{FF2B5EF4-FFF2-40B4-BE49-F238E27FC236}">
+                <a16:creationId xmlns:a16="http://schemas.microsoft.com/office/drawing/2014/main" id="{EF21FC52-C2B3-4EF5-A5D4-F9B0CFC900EC}"/>
+              </a:ext>
+            </a:extLst>
+          </p:cNvPr>
+          <p:cNvSpPr/>
+          <p:nvPr/>
+        </p:nvSpPr>
+        <p:spPr>
+          <a:xfrm>
+            <a:off x="947495" y="4282336"/>
+            <a:ext cx="10648952" cy="369332"/>
+          </a:xfrm>
+          <a:prstGeom prst="rect">
+            <a:avLst/>
+          </a:prstGeom>
+        </p:spPr>
+        <p:txBody>
+          <a:bodyPr wrap="square">
+            <a:spAutoFit/>
+          </a:bodyPr>
+          <a:lstStyle/>
+          <a:p>
+            <a:r>
+              <a:rPr lang="fr-CA" dirty="0"/>
+              <a:t>Envoyer à l’ordinateur un espace pour séparer les éléments d’un message.</a:t>
+            </a:r>
+          </a:p>
+        </p:txBody>
+      </p:sp>
+      <p:sp>
+        <p:nvSpPr>
+          <p:cNvPr id="3" name="Accolade ouvrante 2">
+            <a:extLst>
+              <a:ext uri="{FF2B5EF4-FFF2-40B4-BE49-F238E27FC236}">
+                <a16:creationId xmlns:a16="http://schemas.microsoft.com/office/drawing/2014/main" id="{AC9CBD84-89E7-43A2-9951-317C44FABE7D}"/>
+              </a:ext>
+            </a:extLst>
+          </p:cNvPr>
+          <p:cNvSpPr/>
+          <p:nvPr/>
+        </p:nvSpPr>
+        <p:spPr>
+          <a:xfrm>
+            <a:off x="838200" y="1064638"/>
+            <a:ext cx="179996" cy="840120"/>
+          </a:xfrm>
+          <a:prstGeom prst="leftBrace">
+            <a:avLst>
+              <a:gd name="adj1" fmla="val 41505"/>
+              <a:gd name="adj2" fmla="val 47988"/>
+            </a:avLst>
+          </a:prstGeom>
+          <a:ln w="38100">
+            <a:solidFill>
+              <a:schemeClr val="accent1"/>
+            </a:solidFill>
+          </a:ln>
+        </p:spPr>
+        <p:style>
+          <a:lnRef idx="1">
+            <a:schemeClr val="accent1"/>
+          </a:lnRef>
+          <a:fillRef idx="0">
+            <a:schemeClr val="accent1"/>
+          </a:fillRef>
+          <a:effectRef idx="0">
+            <a:schemeClr val="accent1"/>
+          </a:effectRef>
+          <a:fontRef idx="minor">
+            <a:schemeClr val="tx1"/>
+          </a:fontRef>
+        </p:style>
+        <p:txBody>
+          <a:bodyPr rtlCol="0" anchor="ctr"/>
+          <a:lstStyle/>
+          <a:p>
+            <a:pPr algn="ctr"/>
+            <a:endParaRPr lang="fr-CA"/>
+          </a:p>
+        </p:txBody>
+      </p:sp>
+      <p:sp>
+        <p:nvSpPr>
+          <p:cNvPr id="31" name="Accolade ouvrante 30">
+            <a:extLst>
+              <a:ext uri="{FF2B5EF4-FFF2-40B4-BE49-F238E27FC236}">
+                <a16:creationId xmlns:a16="http://schemas.microsoft.com/office/drawing/2014/main" id="{B471079F-5F97-4899-A9AB-C09244A8B507}"/>
+              </a:ext>
+            </a:extLst>
+          </p:cNvPr>
+          <p:cNvSpPr/>
+          <p:nvPr/>
+        </p:nvSpPr>
+        <p:spPr>
+          <a:xfrm>
+            <a:off x="802943" y="2364625"/>
+            <a:ext cx="222910" cy="2226517"/>
+          </a:xfrm>
+          <a:prstGeom prst="leftBrace">
+            <a:avLst>
+              <a:gd name="adj1" fmla="val 41505"/>
+              <a:gd name="adj2" fmla="val 47988"/>
+            </a:avLst>
+          </a:prstGeom>
+          <a:ln w="38100">
+            <a:solidFill>
+              <a:schemeClr val="accent1"/>
+            </a:solidFill>
+          </a:ln>
+        </p:spPr>
+        <p:style>
+          <a:lnRef idx="1">
+            <a:schemeClr val="accent1"/>
+          </a:lnRef>
+          <a:fillRef idx="0">
+            <a:schemeClr val="accent1"/>
+          </a:fillRef>
+          <a:effectRef idx="0">
+            <a:schemeClr val="accent1"/>
+          </a:effectRef>
+          <a:fontRef idx="minor">
+            <a:schemeClr val="tx1"/>
+          </a:fontRef>
+        </p:style>
+        <p:txBody>
+          <a:bodyPr rtlCol="0" anchor="ctr"/>
+          <a:lstStyle/>
+          <a:p>
+            <a:pPr algn="ctr"/>
+            <a:endParaRPr lang="fr-CA"/>
+          </a:p>
+        </p:txBody>
+      </p:sp>
+      <p:sp>
+        <p:nvSpPr>
+          <p:cNvPr id="32" name="Accolade ouvrante 31">
+            <a:extLst>
+              <a:ext uri="{FF2B5EF4-FFF2-40B4-BE49-F238E27FC236}">
+                <a16:creationId xmlns:a16="http://schemas.microsoft.com/office/drawing/2014/main" id="{4CAAE708-968B-42A9-9AE7-5BB5461DE192}"/>
+              </a:ext>
+            </a:extLst>
+          </p:cNvPr>
+          <p:cNvSpPr/>
+          <p:nvPr/>
+        </p:nvSpPr>
+        <p:spPr>
+          <a:xfrm>
+            <a:off x="741357" y="5052962"/>
+            <a:ext cx="222910" cy="1456863"/>
+          </a:xfrm>
+          <a:prstGeom prst="leftBrace">
+            <a:avLst>
+              <a:gd name="adj1" fmla="val 41505"/>
+              <a:gd name="adj2" fmla="val 47988"/>
+            </a:avLst>
+          </a:prstGeom>
+          <a:ln w="38100">
+            <a:solidFill>
+              <a:schemeClr val="accent1"/>
+            </a:solidFill>
+          </a:ln>
+        </p:spPr>
+        <p:style>
+          <a:lnRef idx="1">
+            <a:schemeClr val="accent1"/>
+          </a:lnRef>
+          <a:fillRef idx="0">
+            <a:schemeClr val="accent1"/>
+          </a:fillRef>
+          <a:effectRef idx="0">
+            <a:schemeClr val="accent1"/>
+          </a:effectRef>
+          <a:fontRef idx="minor">
+            <a:schemeClr val="tx1"/>
+          </a:fontRef>
+        </p:style>
+        <p:txBody>
+          <a:bodyPr rtlCol="0" anchor="ctr"/>
+          <a:lstStyle/>
+          <a:p>
+            <a:pPr algn="ctr"/>
+            <a:endParaRPr lang="fr-CA"/>
+          </a:p>
+        </p:txBody>
+      </p:sp>
+      <p:sp>
+        <p:nvSpPr>
+          <p:cNvPr id="33" name="Rectangle 32">
+            <a:extLst>
+              <a:ext uri="{FF2B5EF4-FFF2-40B4-BE49-F238E27FC236}">
+                <a16:creationId xmlns:a16="http://schemas.microsoft.com/office/drawing/2014/main" id="{7D558F80-E676-4758-86BF-FD4BEFB2F516}"/>
+              </a:ext>
+            </a:extLst>
+          </p:cNvPr>
+          <p:cNvSpPr/>
+          <p:nvPr/>
+        </p:nvSpPr>
+        <p:spPr>
+          <a:xfrm>
+            <a:off x="3445624" y="3794919"/>
+            <a:ext cx="398030" cy="471482"/>
+          </a:xfrm>
+          <a:prstGeom prst="rect">
+            <a:avLst/>
+          </a:prstGeom>
+          <a:noFill/>
+          <a:ln>
+            <a:noFill/>
+          </a:ln>
+        </p:spPr>
+        <p:style>
+          <a:lnRef idx="2">
+            <a:schemeClr val="accent1">
+              <a:shade val="50000"/>
+            </a:schemeClr>
+          </a:lnRef>
+          <a:fillRef idx="1">
+            <a:schemeClr val="accent1"/>
+          </a:fillRef>
+          <a:effectRef idx="0">
+            <a:schemeClr val="accent1"/>
+          </a:effectRef>
+          <a:fontRef idx="minor">
+            <a:schemeClr val="lt1"/>
+          </a:fontRef>
+        </p:style>
+        <p:txBody>
+          <a:bodyPr rtlCol="0" anchor="ctr"/>
+          <a:lstStyle/>
+          <a:p>
+            <a:pPr algn="ctr"/>
+            <a:r>
+              <a:rPr lang="fr-CA" sz="3200" dirty="0">
+                <a:solidFill>
+                  <a:schemeClr val="tx1"/>
+                </a:solidFill>
+              </a:rPr>
+              <a:t>"</a:t>
+            </a:r>
+          </a:p>
+        </p:txBody>
+      </p:sp>
+      <p:sp>
+        <p:nvSpPr>
+          <p:cNvPr id="34" name="Rectangle 33">
+            <a:extLst>
+              <a:ext uri="{FF2B5EF4-FFF2-40B4-BE49-F238E27FC236}">
+                <a16:creationId xmlns:a16="http://schemas.microsoft.com/office/drawing/2014/main" id="{94B9C31D-6513-4628-A251-D4DAAF209348}"/>
+              </a:ext>
+            </a:extLst>
+          </p:cNvPr>
+          <p:cNvSpPr/>
+          <p:nvPr/>
+        </p:nvSpPr>
+        <p:spPr>
+          <a:xfrm>
+            <a:off x="3962060" y="3810854"/>
+            <a:ext cx="398030" cy="471482"/>
+          </a:xfrm>
+          <a:prstGeom prst="rect">
+            <a:avLst/>
+          </a:prstGeom>
+          <a:noFill/>
+          <a:ln>
+            <a:noFill/>
+          </a:ln>
+        </p:spPr>
+        <p:style>
+          <a:lnRef idx="2">
+            <a:schemeClr val="accent1">
+              <a:shade val="50000"/>
+            </a:schemeClr>
+          </a:lnRef>
+          <a:fillRef idx="1">
+            <a:schemeClr val="accent1"/>
+          </a:fillRef>
+          <a:effectRef idx="0">
+            <a:schemeClr val="accent1"/>
+          </a:effectRef>
+          <a:fontRef idx="minor">
+            <a:schemeClr val="lt1"/>
+          </a:fontRef>
+        </p:style>
+        <p:txBody>
+          <a:bodyPr rtlCol="0" anchor="ctr"/>
+          <a:lstStyle/>
+          <a:p>
+            <a:pPr algn="ctr"/>
+            <a:r>
+              <a:rPr lang="fr-CA" sz="3200" dirty="0">
+                <a:solidFill>
+                  <a:schemeClr val="tx1"/>
+                </a:solidFill>
+              </a:rPr>
+              <a:t>"</a:t>
+            </a:r>
+          </a:p>
+        </p:txBody>
+      </p:sp>
+      <p:pic>
+        <p:nvPicPr>
+          <p:cNvPr id="40" name="Image 39">
+            <a:extLst>
+              <a:ext uri="{FF2B5EF4-FFF2-40B4-BE49-F238E27FC236}">
+                <a16:creationId xmlns:a16="http://schemas.microsoft.com/office/drawing/2014/main" id="{2364D956-CC5B-43B5-A52B-371B9E58D73C}"/>
+              </a:ext>
+            </a:extLst>
+          </p:cNvPr>
+          <p:cNvPicPr>
+            <a:picLocks noChangeAspect="1"/>
+          </p:cNvPicPr>
+          <p:nvPr/>
+        </p:nvPicPr>
+        <p:blipFill rotWithShape="1">
+          <a:blip r:embed="rId4"/>
+          <a:srcRect l="96842"/>
+          <a:stretch/>
+        </p:blipFill>
+        <p:spPr>
+          <a:xfrm>
+            <a:off x="4235794" y="3908171"/>
+            <a:ext cx="222911" cy="438211"/>
+          </a:xfrm>
+          <a:prstGeom prst="rect">
+            <a:avLst/>
+          </a:prstGeom>
+        </p:spPr>
+      </p:pic>
     </p:spTree>
     <p:extLst>
       <p:ext uri="{BB962C8B-B14F-4D97-AF65-F5344CB8AC3E}">
-        <p14:creationId xmlns:p14="http://schemas.microsoft.com/office/powerpoint/2010/main" val="3839448070"/>
+        <p14:creationId xmlns:p14="http://schemas.microsoft.com/office/powerpoint/2010/main" val="1953261855"/>
       </p:ext>
     </p:extLst>
   </p:cSld>
@@ -5774,7 +5727,15 @@
           <a:p>
             <a:r>
               <a:rPr lang="fr-CA" sz="2400" dirty="0"/>
-              <a:t>DÉBOGUER AVEC Serial</a:t>
+              <a:t>RECEVOIR DES DONNÉES SÉRIELLES DANS </a:t>
+            </a:r>
+            <a:r>
+              <a:rPr lang="fr-CA" sz="2400" dirty="0">
+                <a:solidFill>
+                  <a:schemeClr val="accent6"/>
+                </a:solidFill>
+              </a:rPr>
+              <a:t>ARDUINO</a:t>
             </a:r>
           </a:p>
         </p:txBody>
@@ -5801,7 +5762,7 @@
         </p:blipFill>
         <p:spPr>
           <a:xfrm>
-            <a:off x="1009650" y="1458785"/>
+            <a:off x="933452" y="1111241"/>
             <a:ext cx="7097115" cy="390580"/>
           </a:xfrm>
           <a:prstGeom prst="rect">
@@ -5809,87 +5770,27 @@
           </a:prstGeom>
         </p:spPr>
       </p:pic>
-      <p:pic>
-        <p:nvPicPr>
-          <p:cNvPr id="24" name="Image 23">
-            <a:extLst>
-              <a:ext uri="{FF2B5EF4-FFF2-40B4-BE49-F238E27FC236}">
-                <a16:creationId xmlns:a16="http://schemas.microsoft.com/office/drawing/2014/main" id="{003CB199-AC20-4FAF-A153-4203C55FE78A}"/>
-              </a:ext>
-            </a:extLst>
-          </p:cNvPr>
-          <p:cNvPicPr>
-            <a:picLocks noChangeAspect="1"/>
-          </p:cNvPicPr>
+      <p:sp>
+        <p:nvSpPr>
+          <p:cNvPr id="26" name="Rectangle 25">
+            <a:extLst>
+              <a:ext uri="{FF2B5EF4-FFF2-40B4-BE49-F238E27FC236}">
+                <a16:creationId xmlns:a16="http://schemas.microsoft.com/office/drawing/2014/main" id="{29ECBC2D-C9B2-4213-8668-EA4AD5A285FC}"/>
+              </a:ext>
+            </a:extLst>
+          </p:cNvPr>
+          <p:cNvSpPr/>
           <p:nvPr/>
-        </p:nvPicPr>
-        <p:blipFill>
-          <a:blip r:embed="rId3"/>
-          <a:stretch>
-            <a:fillRect/>
-          </a:stretch>
-        </p:blipFill>
-        <p:spPr>
-          <a:xfrm>
-            <a:off x="1009650" y="3164091"/>
-            <a:ext cx="7182852" cy="390580"/>
+        </p:nvSpPr>
+        <p:spPr>
+          <a:xfrm>
+            <a:off x="838200" y="1481903"/>
+            <a:ext cx="10648952" cy="646331"/>
           </a:xfrm>
           <a:prstGeom prst="rect">
             <a:avLst/>
           </a:prstGeom>
         </p:spPr>
-      </p:pic>
-      <p:pic>
-        <p:nvPicPr>
-          <p:cNvPr id="25" name="Image 24">
-            <a:extLst>
-              <a:ext uri="{FF2B5EF4-FFF2-40B4-BE49-F238E27FC236}">
-                <a16:creationId xmlns:a16="http://schemas.microsoft.com/office/drawing/2014/main" id="{62D5DF4F-EF92-401A-90F2-24BE3D4DA8E2}"/>
-              </a:ext>
-            </a:extLst>
-          </p:cNvPr>
-          <p:cNvPicPr>
-            <a:picLocks noChangeAspect="1"/>
-          </p:cNvPicPr>
-          <p:nvPr/>
-        </p:nvPicPr>
-        <p:blipFill>
-          <a:blip r:embed="rId4"/>
-          <a:stretch>
-            <a:fillRect/>
-          </a:stretch>
-        </p:blipFill>
-        <p:spPr>
-          <a:xfrm>
-            <a:off x="1009650" y="4729102"/>
-            <a:ext cx="7059010" cy="438211"/>
-          </a:xfrm>
-          <a:prstGeom prst="rect">
-            <a:avLst/>
-          </a:prstGeom>
-        </p:spPr>
-      </p:pic>
-      <p:sp>
-        <p:nvSpPr>
-          <p:cNvPr id="26" name="Rectangle 25">
-            <a:extLst>
-              <a:ext uri="{FF2B5EF4-FFF2-40B4-BE49-F238E27FC236}">
-                <a16:creationId xmlns:a16="http://schemas.microsoft.com/office/drawing/2014/main" id="{29ECBC2D-C9B2-4213-8668-EA4AD5A285FC}"/>
-              </a:ext>
-            </a:extLst>
-          </p:cNvPr>
-          <p:cNvSpPr/>
-          <p:nvPr/>
-        </p:nvSpPr>
-        <p:spPr>
-          <a:xfrm>
-            <a:off x="914398" y="2010908"/>
-            <a:ext cx="10648952" cy="646331"/>
-          </a:xfrm>
-          <a:prstGeom prst="rect">
-            <a:avLst/>
-          </a:prstGeom>
-        </p:spPr>
         <p:txBody>
           <a:bodyPr wrap="square">
             <a:spAutoFit/>
@@ -5925,7 +5826,7 @@
         </p:nvSpPr>
         <p:spPr>
           <a:xfrm>
-            <a:off x="4601076" y="1414344"/>
+            <a:off x="4524878" y="1066800"/>
             <a:ext cx="2094115" cy="471482"/>
           </a:xfrm>
           <a:prstGeom prst="rect">
@@ -5972,10 +5873,10 @@
       </p:sp>
       <p:sp>
         <p:nvSpPr>
-          <p:cNvPr id="36" name="Rectangle 35">
-            <a:extLst>
-              <a:ext uri="{FF2B5EF4-FFF2-40B4-BE49-F238E27FC236}">
-                <a16:creationId xmlns:a16="http://schemas.microsoft.com/office/drawing/2014/main" id="{DCCE8C16-28D1-4898-B717-4D329F5F176B}"/>
+          <p:cNvPr id="37" name="Rectangle 36">
+            <a:extLst>
+              <a:ext uri="{FF2B5EF4-FFF2-40B4-BE49-F238E27FC236}">
+                <a16:creationId xmlns:a16="http://schemas.microsoft.com/office/drawing/2014/main" id="{1E8A71B8-65DF-4B08-B832-78DB03D591F3}"/>
               </a:ext>
             </a:extLst>
           </p:cNvPr>
@@ -5984,8 +5885,8 @@
         </p:nvSpPr>
         <p:spPr>
           <a:xfrm>
-            <a:off x="3706418" y="3083189"/>
-            <a:ext cx="3961207" cy="471482"/>
+            <a:off x="933453" y="3251090"/>
+            <a:ext cx="1480256" cy="471482"/>
           </a:xfrm>
           <a:prstGeom prst="rect">
             <a:avLst/>
@@ -6019,22 +5920,30 @@
           <a:p>
             <a:pPr algn="ctr"/>
             <a:r>
+              <a:rPr lang="fr-CA" sz="3200" dirty="0" err="1">
+                <a:solidFill>
+                  <a:schemeClr val="tx1"/>
+                </a:solidFill>
+              </a:rPr>
+              <a:t>int</a:t>
+            </a:r>
+            <a:r>
               <a:rPr lang="fr-CA" sz="3200" dirty="0">
                 <a:solidFill>
                   <a:schemeClr val="tx1"/>
                 </a:solidFill>
               </a:rPr>
-              <a:t>valeur à envoyer</a:t>
-            </a:r>
-          </a:p>
-        </p:txBody>
-      </p:sp>
-      <p:sp>
-        <p:nvSpPr>
-          <p:cNvPr id="37" name="Rectangle 36">
-            <a:extLst>
-              <a:ext uri="{FF2B5EF4-FFF2-40B4-BE49-F238E27FC236}">
-                <a16:creationId xmlns:a16="http://schemas.microsoft.com/office/drawing/2014/main" id="{1E8A71B8-65DF-4B08-B832-78DB03D591F3}"/>
+              <a:t> data</a:t>
+            </a:r>
+          </a:p>
+        </p:txBody>
+      </p:sp>
+      <p:sp>
+        <p:nvSpPr>
+          <p:cNvPr id="39" name="Rectangle 38">
+            <a:extLst>
+              <a:ext uri="{FF2B5EF4-FFF2-40B4-BE49-F238E27FC236}">
+                <a16:creationId xmlns:a16="http://schemas.microsoft.com/office/drawing/2014/main" id="{AD5C3158-B106-4F9A-9755-3024C2CF7630}"/>
               </a:ext>
             </a:extLst>
           </p:cNvPr>
@@ -6043,71 +5952,12 @@
         </p:nvSpPr>
         <p:spPr>
           <a:xfrm>
-            <a:off x="4211243" y="4695831"/>
-            <a:ext cx="3456382" cy="471482"/>
+            <a:off x="933453" y="3722572"/>
+            <a:ext cx="10648952" cy="369332"/>
           </a:xfrm>
           <a:prstGeom prst="rect">
             <a:avLst/>
           </a:prstGeom>
-          <a:solidFill>
-            <a:schemeClr val="accent3"/>
-          </a:solidFill>
-          <a:ln>
-            <a:noFill/>
-          </a:ln>
-        </p:spPr>
-        <p:style>
-          <a:lnRef idx="2">
-            <a:schemeClr val="accent1">
-              <a:shade val="50000"/>
-            </a:schemeClr>
-          </a:lnRef>
-          <a:fillRef idx="1">
-            <a:schemeClr val="accent1"/>
-          </a:fillRef>
-          <a:effectRef idx="0">
-            <a:schemeClr val="accent1"/>
-          </a:effectRef>
-          <a:fontRef idx="minor">
-            <a:schemeClr val="lt1"/>
-          </a:fontRef>
-        </p:style>
-        <p:txBody>
-          <a:bodyPr rtlCol="0" anchor="ctr"/>
-          <a:lstStyle/>
-          <a:p>
-            <a:pPr algn="ctr"/>
-            <a:r>
-              <a:rPr lang="fr-CA" sz="3200" dirty="0">
-                <a:solidFill>
-                  <a:schemeClr val="tx1"/>
-                </a:solidFill>
-              </a:rPr>
-              <a:t>valeur à imprimer</a:t>
-            </a:r>
-          </a:p>
-        </p:txBody>
-      </p:sp>
-      <p:sp>
-        <p:nvSpPr>
-          <p:cNvPr id="38" name="Rectangle 37">
-            <a:extLst>
-              <a:ext uri="{FF2B5EF4-FFF2-40B4-BE49-F238E27FC236}">
-                <a16:creationId xmlns:a16="http://schemas.microsoft.com/office/drawing/2014/main" id="{0A1A45C1-C6ED-473E-AEED-2129ED1CEA1F}"/>
-              </a:ext>
-            </a:extLst>
-          </p:cNvPr>
-          <p:cNvSpPr/>
-          <p:nvPr/>
-        </p:nvSpPr>
-        <p:spPr>
-          <a:xfrm>
-            <a:off x="914398" y="3625662"/>
-            <a:ext cx="10648952" cy="369332"/>
-          </a:xfrm>
-          <a:prstGeom prst="rect">
-            <a:avLst/>
-          </a:prstGeom>
         </p:spPr>
         <p:txBody>
           <a:bodyPr wrap="square">
@@ -6117,779 +5967,17 @@
           <a:p>
             <a:r>
               <a:rPr lang="fr-CA" dirty="0"/>
-              <a:t>Envoie à l’ordinateur une valeur en mode texte.</a:t>
-            </a:r>
-          </a:p>
-        </p:txBody>
-      </p:sp>
-      <p:sp>
-        <p:nvSpPr>
-          <p:cNvPr id="39" name="Rectangle 38">
-            <a:extLst>
-              <a:ext uri="{FF2B5EF4-FFF2-40B4-BE49-F238E27FC236}">
-                <a16:creationId xmlns:a16="http://schemas.microsoft.com/office/drawing/2014/main" id="{AD5C3158-B106-4F9A-9755-3024C2CF7630}"/>
-              </a:ext>
-            </a:extLst>
-          </p:cNvPr>
-          <p:cNvSpPr/>
-          <p:nvPr/>
-        </p:nvSpPr>
-        <p:spPr>
-          <a:xfrm>
-            <a:off x="914398" y="5161807"/>
-            <a:ext cx="10648952" cy="369332"/>
-          </a:xfrm>
-          <a:prstGeom prst="rect">
-            <a:avLst/>
-          </a:prstGeom>
-        </p:spPr>
-        <p:txBody>
-          <a:bodyPr wrap="square">
-            <a:spAutoFit/>
-          </a:bodyPr>
-          <a:lstStyle/>
-          <a:p>
-            <a:r>
-              <a:rPr lang="fr-CA" dirty="0"/>
-              <a:t>Envoie à l’ordinateur une valeur en mode texte, suivi d’un retour à la ligne (ln).</a:t>
-            </a:r>
-          </a:p>
-        </p:txBody>
-      </p:sp>
-    </p:spTree>
-    <p:extLst>
-      <p:ext uri="{BB962C8B-B14F-4D97-AF65-F5344CB8AC3E}">
-        <p14:creationId xmlns:p14="http://schemas.microsoft.com/office/powerpoint/2010/main" val="3292424376"/>
-      </p:ext>
-    </p:extLst>
-  </p:cSld>
-  <p:clrMapOvr>
-    <a:masterClrMapping/>
-  </p:clrMapOvr>
-</p:sld>
-</file>
-
-<file path=ppt/slides/slide5.xml><?xml version="1.0" encoding="utf-8"?>
-<p:sld xmlns:a="http://schemas.openxmlformats.org/drawingml/2006/main" xmlns:r="http://schemas.openxmlformats.org/officeDocument/2006/relationships" xmlns:p="http://schemas.openxmlformats.org/presentationml/2006/main">
-  <p:cSld>
-    <p:spTree>
-      <p:nvGrpSpPr>
-        <p:cNvPr id="1" name=""/>
-        <p:cNvGrpSpPr/>
-        <p:nvPr/>
-      </p:nvGrpSpPr>
-      <p:grpSpPr>
-        <a:xfrm>
-          <a:off x="0" y="0"/>
-          <a:ext cx="0" cy="0"/>
-          <a:chOff x="0" y="0"/>
-          <a:chExt cx="0" cy="0"/>
-        </a:xfrm>
-      </p:grpSpPr>
-      <p:sp>
-        <p:nvSpPr>
-          <p:cNvPr id="2" name="Titre 1">
-            <a:extLst>
-              <a:ext uri="{FF2B5EF4-FFF2-40B4-BE49-F238E27FC236}">
-                <a16:creationId xmlns:a16="http://schemas.microsoft.com/office/drawing/2014/main" id="{7005A587-273D-4A3C-859E-17AD32EABF34}"/>
-              </a:ext>
-            </a:extLst>
-          </p:cNvPr>
-          <p:cNvSpPr>
-            <a:spLocks noGrp="1"/>
-          </p:cNvSpPr>
-          <p:nvPr>
-            <p:ph type="title"/>
-          </p:nvPr>
-        </p:nvSpPr>
-        <p:spPr/>
-        <p:txBody>
-          <a:bodyPr>
-            <a:normAutofit/>
-          </a:bodyPr>
-          <a:lstStyle/>
-          <a:p>
-            <a:r>
-              <a:rPr lang="fr-CA" sz="2400" dirty="0"/>
-              <a:t>LE BAUD ET OUVRIR LE MONITEUR SÉRIE</a:t>
-            </a:r>
-          </a:p>
-        </p:txBody>
-      </p:sp>
-      <p:grpSp>
-        <p:nvGrpSpPr>
-          <p:cNvPr id="9" name="Groupe 8">
-            <a:extLst>
-              <a:ext uri="{FF2B5EF4-FFF2-40B4-BE49-F238E27FC236}">
-                <a16:creationId xmlns:a16="http://schemas.microsoft.com/office/drawing/2014/main" id="{1AACC0C1-6A36-4F0A-A8BB-577E72A84163}"/>
-              </a:ext>
-            </a:extLst>
-          </p:cNvPr>
-          <p:cNvGrpSpPr/>
-          <p:nvPr/>
-        </p:nvGrpSpPr>
-        <p:grpSpPr>
-          <a:xfrm>
-            <a:off x="5003995" y="2008041"/>
-            <a:ext cx="6841431" cy="4670527"/>
-            <a:chOff x="4435530" y="1406423"/>
-            <a:chExt cx="7304696" cy="4986790"/>
-          </a:xfrm>
-        </p:grpSpPr>
-        <p:pic>
-          <p:nvPicPr>
-            <p:cNvPr id="3" name="Image 2">
-              <a:extLst>
-                <a:ext uri="{FF2B5EF4-FFF2-40B4-BE49-F238E27FC236}">
-                  <a16:creationId xmlns:a16="http://schemas.microsoft.com/office/drawing/2014/main" id="{760BBBCE-92B9-4BF2-8A33-6AF7521D3FD5}"/>
-                </a:ext>
-              </a:extLst>
-            </p:cNvPr>
-            <p:cNvPicPr>
-              <a:picLocks noChangeAspect="1"/>
-            </p:cNvPicPr>
-            <p:nvPr/>
-          </p:nvPicPr>
-          <p:blipFill>
-            <a:blip r:embed="rId2"/>
-            <a:stretch>
-              <a:fillRect/>
-            </a:stretch>
-          </p:blipFill>
-          <p:spPr>
-            <a:xfrm>
-              <a:off x="4435530" y="1406423"/>
-              <a:ext cx="7304696" cy="4986790"/>
-            </a:xfrm>
-            <a:prstGeom prst="rect">
-              <a:avLst/>
-            </a:prstGeom>
-          </p:spPr>
-        </p:pic>
-        <p:sp>
-          <p:nvSpPr>
-            <p:cNvPr id="12" name="Forme libre : forme 11">
-              <a:extLst>
-                <a:ext uri="{FF2B5EF4-FFF2-40B4-BE49-F238E27FC236}">
-                  <a16:creationId xmlns:a16="http://schemas.microsoft.com/office/drawing/2014/main" id="{42355D56-6B11-442C-AD4F-B32A3BD12F57}"/>
-                </a:ext>
-              </a:extLst>
-            </p:cNvPr>
-            <p:cNvSpPr/>
-            <p:nvPr/>
-          </p:nvSpPr>
-          <p:spPr>
-            <a:xfrm>
-              <a:off x="9448800" y="2126393"/>
-              <a:ext cx="1157689" cy="811458"/>
-            </a:xfrm>
-            <a:custGeom>
-              <a:avLst/>
-              <a:gdLst>
-                <a:gd name="connsiteX0" fmla="*/ 0 w 3599411"/>
-                <a:gd name="connsiteY0" fmla="*/ 253960 h 727786"/>
-                <a:gd name="connsiteX1" fmla="*/ 2236124 w 3599411"/>
-                <a:gd name="connsiteY1" fmla="*/ 21204 h 727786"/>
-                <a:gd name="connsiteX2" fmla="*/ 3599411 w 3599411"/>
-                <a:gd name="connsiteY2" fmla="*/ 727786 h 727786"/>
-                <a:gd name="connsiteX0" fmla="*/ 0 w 3699164"/>
-                <a:gd name="connsiteY0" fmla="*/ 268879 h 975462"/>
-                <a:gd name="connsiteX1" fmla="*/ 2236124 w 3699164"/>
-                <a:gd name="connsiteY1" fmla="*/ 36123 h 975462"/>
-                <a:gd name="connsiteX2" fmla="*/ 3699164 w 3699164"/>
-                <a:gd name="connsiteY2" fmla="*/ 975462 h 975462"/>
-                <a:gd name="connsiteX0" fmla="*/ 0 w 3699164"/>
-                <a:gd name="connsiteY0" fmla="*/ 268879 h 975462"/>
-                <a:gd name="connsiteX1" fmla="*/ 2236124 w 3699164"/>
-                <a:gd name="connsiteY1" fmla="*/ 36123 h 975462"/>
-                <a:gd name="connsiteX2" fmla="*/ 3699164 w 3699164"/>
-                <a:gd name="connsiteY2" fmla="*/ 975462 h 975462"/>
-                <a:gd name="connsiteX0" fmla="*/ 0 w 3699164"/>
-                <a:gd name="connsiteY0" fmla="*/ 257280 h 963863"/>
-                <a:gd name="connsiteX1" fmla="*/ 2236124 w 3699164"/>
-                <a:gd name="connsiteY1" fmla="*/ 24524 h 963863"/>
-                <a:gd name="connsiteX2" fmla="*/ 3699164 w 3699164"/>
-                <a:gd name="connsiteY2" fmla="*/ 963863 h 963863"/>
-                <a:gd name="connsiteX0" fmla="*/ 325762 w 1605576"/>
-                <a:gd name="connsiteY0" fmla="*/ 86 h 1382944"/>
-                <a:gd name="connsiteX1" fmla="*/ 142536 w 1605576"/>
-                <a:gd name="connsiteY1" fmla="*/ 443605 h 1382944"/>
-                <a:gd name="connsiteX2" fmla="*/ 1605576 w 1605576"/>
-                <a:gd name="connsiteY2" fmla="*/ 1382944 h 1382944"/>
-                <a:gd name="connsiteX0" fmla="*/ 0 w 1279814"/>
-                <a:gd name="connsiteY0" fmla="*/ 100 h 1382958"/>
-                <a:gd name="connsiteX1" fmla="*/ 740699 w 1279814"/>
-                <a:gd name="connsiteY1" fmla="*/ 395994 h 1382958"/>
-                <a:gd name="connsiteX2" fmla="*/ 1279814 w 1279814"/>
-                <a:gd name="connsiteY2" fmla="*/ 1382958 h 1382958"/>
-                <a:gd name="connsiteX0" fmla="*/ 0 w 1628461"/>
-                <a:gd name="connsiteY0" fmla="*/ 100 h 1382958"/>
-                <a:gd name="connsiteX1" fmla="*/ 740699 w 1628461"/>
-                <a:gd name="connsiteY1" fmla="*/ 395994 h 1382958"/>
-                <a:gd name="connsiteX2" fmla="*/ 1279814 w 1628461"/>
-                <a:gd name="connsiteY2" fmla="*/ 1382958 h 1382958"/>
-                <a:gd name="connsiteX0" fmla="*/ 0 w 1356195"/>
-                <a:gd name="connsiteY0" fmla="*/ 100 h 811458"/>
-                <a:gd name="connsiteX1" fmla="*/ 740699 w 1356195"/>
-                <a:gd name="connsiteY1" fmla="*/ 395994 h 811458"/>
-                <a:gd name="connsiteX2" fmla="*/ 889289 w 1356195"/>
-                <a:gd name="connsiteY2" fmla="*/ 811458 h 811458"/>
-              </a:gdLst>
-              <a:ahLst/>
-              <a:cxnLst>
-                <a:cxn ang="0">
-                  <a:pos x="connsiteX0" y="connsiteY0"/>
-                </a:cxn>
-                <a:cxn ang="0">
-                  <a:pos x="connsiteX1" y="connsiteY1"/>
-                </a:cxn>
-                <a:cxn ang="0">
-                  <a:pos x="connsiteX2" y="connsiteY2"/>
-                </a:cxn>
-              </a:cxnLst>
-              <a:rect l="l" t="t" r="r" b="b"/>
-              <a:pathLst>
-                <a:path w="1356195" h="811458">
-                  <a:moveTo>
-                    <a:pt x="0" y="100"/>
-                  </a:moveTo>
-                  <a:cubicBezTo>
-                    <a:pt x="834736" y="-6135"/>
-                    <a:pt x="124172" y="278230"/>
-                    <a:pt x="740699" y="395994"/>
-                  </a:cubicBezTo>
-                  <a:cubicBezTo>
-                    <a:pt x="1357226" y="513758"/>
-                    <a:pt x="1677959" y="703046"/>
-                    <a:pt x="889289" y="811458"/>
-                  </a:cubicBezTo>
-                </a:path>
-              </a:pathLst>
-            </a:custGeom>
-            <a:noFill/>
-            <a:ln w="57150">
-              <a:solidFill>
-                <a:schemeClr val="accent2"/>
-              </a:solidFill>
-              <a:headEnd type="none" w="med" len="med"/>
-              <a:tailEnd type="triangle" w="med" len="med"/>
-            </a:ln>
-          </p:spPr>
-          <p:style>
-            <a:lnRef idx="2">
-              <a:schemeClr val="accent1">
-                <a:shade val="50000"/>
-              </a:schemeClr>
-            </a:lnRef>
-            <a:fillRef idx="1">
-              <a:schemeClr val="accent1"/>
-            </a:fillRef>
-            <a:effectRef idx="0">
-              <a:schemeClr val="accent1"/>
-            </a:effectRef>
-            <a:fontRef idx="minor">
-              <a:schemeClr val="lt1"/>
-            </a:fontRef>
-          </p:style>
-          <p:txBody>
-            <a:bodyPr rtlCol="0" anchor="ctr"/>
-            <a:lstStyle/>
-            <a:p>
-              <a:pPr algn="ctr"/>
-              <a:endParaRPr lang="fr-CA" dirty="0"/>
-            </a:p>
-          </p:txBody>
-        </p:sp>
-        <p:sp>
-          <p:nvSpPr>
-            <p:cNvPr id="4" name="Ellipse 3">
-              <a:extLst>
-                <a:ext uri="{FF2B5EF4-FFF2-40B4-BE49-F238E27FC236}">
-                  <a16:creationId xmlns:a16="http://schemas.microsoft.com/office/drawing/2014/main" id="{BF1D5E84-98A7-4073-BE5D-B616BA42232F}"/>
-                </a:ext>
-              </a:extLst>
-            </p:cNvPr>
-            <p:cNvSpPr/>
-            <p:nvPr/>
-          </p:nvSpPr>
-          <p:spPr>
-            <a:xfrm>
-              <a:off x="8210550" y="1838325"/>
-              <a:ext cx="1238250" cy="581025"/>
-            </a:xfrm>
-            <a:prstGeom prst="ellipse">
-              <a:avLst/>
-            </a:prstGeom>
-            <a:noFill/>
-            <a:ln w="57150">
-              <a:solidFill>
-                <a:schemeClr val="accent2"/>
-              </a:solidFill>
-              <a:prstDash val="sysDash"/>
-            </a:ln>
-          </p:spPr>
-          <p:style>
-            <a:lnRef idx="2">
-              <a:schemeClr val="accent1">
-                <a:shade val="50000"/>
-              </a:schemeClr>
-            </a:lnRef>
-            <a:fillRef idx="1">
-              <a:schemeClr val="accent1"/>
-            </a:fillRef>
-            <a:effectRef idx="0">
-              <a:schemeClr val="accent1"/>
-            </a:effectRef>
-            <a:fontRef idx="minor">
-              <a:schemeClr val="lt1"/>
-            </a:fontRef>
-          </p:style>
-          <p:txBody>
-            <a:bodyPr rtlCol="0" anchor="ctr"/>
-            <a:lstStyle/>
-            <a:p>
-              <a:pPr algn="ctr"/>
-              <a:endParaRPr lang="fr-CA"/>
-            </a:p>
-          </p:txBody>
-        </p:sp>
-        <p:sp>
-          <p:nvSpPr>
-            <p:cNvPr id="17" name="Ellipse 16">
-              <a:extLst>
-                <a:ext uri="{FF2B5EF4-FFF2-40B4-BE49-F238E27FC236}">
-                  <a16:creationId xmlns:a16="http://schemas.microsoft.com/office/drawing/2014/main" id="{1E998372-32EA-47CE-89ED-17DD5B1106D1}"/>
-                </a:ext>
-              </a:extLst>
-            </p:cNvPr>
-            <p:cNvSpPr/>
-            <p:nvPr/>
-          </p:nvSpPr>
-          <p:spPr>
-            <a:xfrm>
-              <a:off x="9782175" y="5810704"/>
-              <a:ext cx="1157689" cy="504372"/>
-            </a:xfrm>
-            <a:prstGeom prst="ellipse">
-              <a:avLst/>
-            </a:prstGeom>
-            <a:noFill/>
-            <a:ln w="57150">
-              <a:solidFill>
-                <a:schemeClr val="accent2"/>
-              </a:solidFill>
-              <a:prstDash val="sysDash"/>
-            </a:ln>
-          </p:spPr>
-          <p:style>
-            <a:lnRef idx="2">
-              <a:schemeClr val="accent1">
-                <a:shade val="50000"/>
-              </a:schemeClr>
-            </a:lnRef>
-            <a:fillRef idx="1">
-              <a:schemeClr val="accent1"/>
-            </a:fillRef>
-            <a:effectRef idx="0">
-              <a:schemeClr val="accent1"/>
-            </a:effectRef>
-            <a:fontRef idx="minor">
-              <a:schemeClr val="lt1"/>
-            </a:fontRef>
-          </p:style>
-          <p:txBody>
-            <a:bodyPr rtlCol="0" anchor="ctr"/>
-            <a:lstStyle/>
-            <a:p>
-              <a:pPr algn="ctr"/>
-              <a:endParaRPr lang="fr-CA"/>
-            </a:p>
-          </p:txBody>
-        </p:sp>
-        <p:sp>
-          <p:nvSpPr>
-            <p:cNvPr id="18" name="Forme libre : forme 17">
-              <a:extLst>
-                <a:ext uri="{FF2B5EF4-FFF2-40B4-BE49-F238E27FC236}">
-                  <a16:creationId xmlns:a16="http://schemas.microsoft.com/office/drawing/2014/main" id="{9D0586C2-9177-4D9A-81AD-2B21BDBFA62F}"/>
-                </a:ext>
-              </a:extLst>
-            </p:cNvPr>
-            <p:cNvSpPr/>
-            <p:nvPr/>
-          </p:nvSpPr>
-          <p:spPr>
-            <a:xfrm>
-              <a:off x="9647420" y="2963590"/>
-              <a:ext cx="710223" cy="2792727"/>
-            </a:xfrm>
-            <a:custGeom>
-              <a:avLst/>
-              <a:gdLst>
-                <a:gd name="connsiteX0" fmla="*/ 0 w 3599411"/>
-                <a:gd name="connsiteY0" fmla="*/ 253960 h 727786"/>
-                <a:gd name="connsiteX1" fmla="*/ 2236124 w 3599411"/>
-                <a:gd name="connsiteY1" fmla="*/ 21204 h 727786"/>
-                <a:gd name="connsiteX2" fmla="*/ 3599411 w 3599411"/>
-                <a:gd name="connsiteY2" fmla="*/ 727786 h 727786"/>
-                <a:gd name="connsiteX0" fmla="*/ 0 w 3699164"/>
-                <a:gd name="connsiteY0" fmla="*/ 268879 h 975462"/>
-                <a:gd name="connsiteX1" fmla="*/ 2236124 w 3699164"/>
-                <a:gd name="connsiteY1" fmla="*/ 36123 h 975462"/>
-                <a:gd name="connsiteX2" fmla="*/ 3699164 w 3699164"/>
-                <a:gd name="connsiteY2" fmla="*/ 975462 h 975462"/>
-                <a:gd name="connsiteX0" fmla="*/ 0 w 3699164"/>
-                <a:gd name="connsiteY0" fmla="*/ 268879 h 975462"/>
-                <a:gd name="connsiteX1" fmla="*/ 2236124 w 3699164"/>
-                <a:gd name="connsiteY1" fmla="*/ 36123 h 975462"/>
-                <a:gd name="connsiteX2" fmla="*/ 3699164 w 3699164"/>
-                <a:gd name="connsiteY2" fmla="*/ 975462 h 975462"/>
-                <a:gd name="connsiteX0" fmla="*/ 0 w 3699164"/>
-                <a:gd name="connsiteY0" fmla="*/ 257280 h 963863"/>
-                <a:gd name="connsiteX1" fmla="*/ 2236124 w 3699164"/>
-                <a:gd name="connsiteY1" fmla="*/ 24524 h 963863"/>
-                <a:gd name="connsiteX2" fmla="*/ 3699164 w 3699164"/>
-                <a:gd name="connsiteY2" fmla="*/ 963863 h 963863"/>
-                <a:gd name="connsiteX0" fmla="*/ 325762 w 1605576"/>
-                <a:gd name="connsiteY0" fmla="*/ 86 h 1382944"/>
-                <a:gd name="connsiteX1" fmla="*/ 142536 w 1605576"/>
-                <a:gd name="connsiteY1" fmla="*/ 443605 h 1382944"/>
-                <a:gd name="connsiteX2" fmla="*/ 1605576 w 1605576"/>
-                <a:gd name="connsiteY2" fmla="*/ 1382944 h 1382944"/>
-                <a:gd name="connsiteX0" fmla="*/ 0 w 1279814"/>
-                <a:gd name="connsiteY0" fmla="*/ 100 h 1382958"/>
-                <a:gd name="connsiteX1" fmla="*/ 740699 w 1279814"/>
-                <a:gd name="connsiteY1" fmla="*/ 395994 h 1382958"/>
-                <a:gd name="connsiteX2" fmla="*/ 1279814 w 1279814"/>
-                <a:gd name="connsiteY2" fmla="*/ 1382958 h 1382958"/>
-                <a:gd name="connsiteX0" fmla="*/ 0 w 1628461"/>
-                <a:gd name="connsiteY0" fmla="*/ 100 h 1382958"/>
-                <a:gd name="connsiteX1" fmla="*/ 740699 w 1628461"/>
-                <a:gd name="connsiteY1" fmla="*/ 395994 h 1382958"/>
-                <a:gd name="connsiteX2" fmla="*/ 1279814 w 1628461"/>
-                <a:gd name="connsiteY2" fmla="*/ 1382958 h 1382958"/>
-                <a:gd name="connsiteX0" fmla="*/ 0 w 1356195"/>
-                <a:gd name="connsiteY0" fmla="*/ 100 h 811458"/>
-                <a:gd name="connsiteX1" fmla="*/ 740699 w 1356195"/>
-                <a:gd name="connsiteY1" fmla="*/ 395994 h 811458"/>
-                <a:gd name="connsiteX2" fmla="*/ 889289 w 1356195"/>
-                <a:gd name="connsiteY2" fmla="*/ 811458 h 811458"/>
-                <a:gd name="connsiteX0" fmla="*/ 153558 w 773310"/>
-                <a:gd name="connsiteY0" fmla="*/ 18 h 2106776"/>
-                <a:gd name="connsiteX1" fmla="*/ 157814 w 773310"/>
-                <a:gd name="connsiteY1" fmla="*/ 1691312 h 2106776"/>
-                <a:gd name="connsiteX2" fmla="*/ 306404 w 773310"/>
-                <a:gd name="connsiteY2" fmla="*/ 2106776 h 2106776"/>
-                <a:gd name="connsiteX0" fmla="*/ 494148 w 1113900"/>
-                <a:gd name="connsiteY0" fmla="*/ 0 h 2106758"/>
-                <a:gd name="connsiteX1" fmla="*/ 498404 w 1113900"/>
-                <a:gd name="connsiteY1" fmla="*/ 1691294 h 2106758"/>
-                <a:gd name="connsiteX2" fmla="*/ 646994 w 1113900"/>
-                <a:gd name="connsiteY2" fmla="*/ 2106758 h 2106758"/>
-                <a:gd name="connsiteX0" fmla="*/ 494148 w 1846133"/>
-                <a:gd name="connsiteY0" fmla="*/ 0 h 2840183"/>
-                <a:gd name="connsiteX1" fmla="*/ 498404 w 1846133"/>
-                <a:gd name="connsiteY1" fmla="*/ 1691294 h 2840183"/>
-                <a:gd name="connsiteX2" fmla="*/ 1595443 w 1846133"/>
-                <a:gd name="connsiteY2" fmla="*/ 2840183 h 2840183"/>
-                <a:gd name="connsiteX0" fmla="*/ 319427 w 1756602"/>
-                <a:gd name="connsiteY0" fmla="*/ 0 h 2840183"/>
-                <a:gd name="connsiteX1" fmla="*/ 825804 w 1756602"/>
-                <a:gd name="connsiteY1" fmla="*/ 1548419 h 2840183"/>
-                <a:gd name="connsiteX2" fmla="*/ 1420722 w 1756602"/>
-                <a:gd name="connsiteY2" fmla="*/ 2840183 h 2840183"/>
-                <a:gd name="connsiteX0" fmla="*/ 319427 w 1676091"/>
-                <a:gd name="connsiteY0" fmla="*/ 0 h 2840183"/>
-                <a:gd name="connsiteX1" fmla="*/ 825804 w 1676091"/>
-                <a:gd name="connsiteY1" fmla="*/ 1548419 h 2840183"/>
-                <a:gd name="connsiteX2" fmla="*/ 1420722 w 1676091"/>
-                <a:gd name="connsiteY2" fmla="*/ 2840183 h 2840183"/>
-                <a:gd name="connsiteX0" fmla="*/ 232608 w 1585139"/>
-                <a:gd name="connsiteY0" fmla="*/ 0 h 2840183"/>
-                <a:gd name="connsiteX1" fmla="*/ 738985 w 1585139"/>
-                <a:gd name="connsiteY1" fmla="*/ 1548419 h 2840183"/>
-                <a:gd name="connsiteX2" fmla="*/ 1333903 w 1585139"/>
-                <a:gd name="connsiteY2" fmla="*/ 2840183 h 2840183"/>
-                <a:gd name="connsiteX0" fmla="*/ 321766 w 1769968"/>
-                <a:gd name="connsiteY0" fmla="*/ 0 h 2840183"/>
-                <a:gd name="connsiteX1" fmla="*/ 828143 w 1769968"/>
-                <a:gd name="connsiteY1" fmla="*/ 1548419 h 2840183"/>
-                <a:gd name="connsiteX2" fmla="*/ 1423061 w 1769968"/>
-                <a:gd name="connsiteY2" fmla="*/ 2840183 h 2840183"/>
-                <a:gd name="connsiteX0" fmla="*/ 440737 w 1888939"/>
-                <a:gd name="connsiteY0" fmla="*/ 119 h 2840302"/>
-                <a:gd name="connsiteX1" fmla="*/ 947114 w 1888939"/>
-                <a:gd name="connsiteY1" fmla="*/ 1548538 h 2840302"/>
-                <a:gd name="connsiteX2" fmla="*/ 1542032 w 1888939"/>
-                <a:gd name="connsiteY2" fmla="*/ 2840302 h 2840302"/>
-                <a:gd name="connsiteX0" fmla="*/ 440737 w 2077023"/>
-                <a:gd name="connsiteY0" fmla="*/ 119 h 2843122"/>
-                <a:gd name="connsiteX1" fmla="*/ 947114 w 2077023"/>
-                <a:gd name="connsiteY1" fmla="*/ 1548538 h 2843122"/>
-                <a:gd name="connsiteX2" fmla="*/ 1542032 w 2077023"/>
-                <a:gd name="connsiteY2" fmla="*/ 2840302 h 2843122"/>
-                <a:gd name="connsiteX0" fmla="*/ 443543 w 2077154"/>
-                <a:gd name="connsiteY0" fmla="*/ 119 h 2843103"/>
-                <a:gd name="connsiteX1" fmla="*/ 938761 w 2077154"/>
-                <a:gd name="connsiteY1" fmla="*/ 1539013 h 2843103"/>
-                <a:gd name="connsiteX2" fmla="*/ 1544838 w 2077154"/>
-                <a:gd name="connsiteY2" fmla="*/ 2840302 h 2843103"/>
-                <a:gd name="connsiteX0" fmla="*/ 441597 w 2089290"/>
-                <a:gd name="connsiteY0" fmla="*/ 127 h 2843356"/>
-                <a:gd name="connsiteX1" fmla="*/ 936815 w 2089290"/>
-                <a:gd name="connsiteY1" fmla="*/ 1539021 h 2843356"/>
-                <a:gd name="connsiteX2" fmla="*/ 1542892 w 2089290"/>
-                <a:gd name="connsiteY2" fmla="*/ 2840310 h 2843356"/>
-                <a:gd name="connsiteX0" fmla="*/ 301910 w 1799448"/>
-                <a:gd name="connsiteY0" fmla="*/ 188 h 2844092"/>
-                <a:gd name="connsiteX1" fmla="*/ 797128 w 1799448"/>
-                <a:gd name="connsiteY1" fmla="*/ 1539082 h 2844092"/>
-                <a:gd name="connsiteX2" fmla="*/ 1403205 w 1799448"/>
-                <a:gd name="connsiteY2" fmla="*/ 2840371 h 2844092"/>
-                <a:gd name="connsiteX0" fmla="*/ 334553 w 1080732"/>
-                <a:gd name="connsiteY0" fmla="*/ 167 h 2702194"/>
-                <a:gd name="connsiteX1" fmla="*/ 829771 w 1080732"/>
-                <a:gd name="connsiteY1" fmla="*/ 1539061 h 2702194"/>
-                <a:gd name="connsiteX2" fmla="*/ 398134 w 1080732"/>
-                <a:gd name="connsiteY2" fmla="*/ 2697475 h 2702194"/>
-                <a:gd name="connsiteX0" fmla="*/ 334553 w 829846"/>
-                <a:gd name="connsiteY0" fmla="*/ 167 h 2697475"/>
-                <a:gd name="connsiteX1" fmla="*/ 829771 w 829846"/>
-                <a:gd name="connsiteY1" fmla="*/ 1539061 h 2697475"/>
-                <a:gd name="connsiteX2" fmla="*/ 398134 w 829846"/>
-                <a:gd name="connsiteY2" fmla="*/ 2697475 h 2697475"/>
-                <a:gd name="connsiteX0" fmla="*/ 336392 w 832003"/>
-                <a:gd name="connsiteY0" fmla="*/ 169 h 2792727"/>
-                <a:gd name="connsiteX1" fmla="*/ 831610 w 832003"/>
-                <a:gd name="connsiteY1" fmla="*/ 1539063 h 2792727"/>
-                <a:gd name="connsiteX2" fmla="*/ 478080 w 832003"/>
-                <a:gd name="connsiteY2" fmla="*/ 2792727 h 2792727"/>
-              </a:gdLst>
-              <a:ahLst/>
-              <a:cxnLst>
-                <a:cxn ang="0">
-                  <a:pos x="connsiteX0" y="connsiteY0"/>
-                </a:cxn>
-                <a:cxn ang="0">
-                  <a:pos x="connsiteX1" y="connsiteY1"/>
-                </a:cxn>
-                <a:cxn ang="0">
-                  <a:pos x="connsiteX2" y="connsiteY2"/>
-                </a:cxn>
-              </a:cxnLst>
-              <a:rect l="l" t="t" r="r" b="b"/>
-              <a:pathLst>
-                <a:path w="832003" h="2792727">
-                  <a:moveTo>
-                    <a:pt x="336392" y="169"/>
-                  </a:moveTo>
-                  <a:cubicBezTo>
-                    <a:pt x="-636505" y="-15591"/>
-                    <a:pt x="807995" y="1073637"/>
-                    <a:pt x="831610" y="1539063"/>
-                  </a:cubicBezTo>
-                  <a:cubicBezTo>
-                    <a:pt x="855225" y="2004489"/>
-                    <a:pt x="-194977" y="2055665"/>
-                    <a:pt x="478080" y="2792727"/>
-                  </a:cubicBezTo>
-                </a:path>
-              </a:pathLst>
-            </a:custGeom>
-            <a:noFill/>
-            <a:ln w="57150">
-              <a:solidFill>
-                <a:schemeClr val="accent2"/>
-              </a:solidFill>
-              <a:headEnd type="none" w="med" len="med"/>
-              <a:tailEnd type="triangle" w="med" len="med"/>
-            </a:ln>
-          </p:spPr>
-          <p:style>
-            <a:lnRef idx="2">
-              <a:schemeClr val="accent1">
-                <a:shade val="50000"/>
-              </a:schemeClr>
-            </a:lnRef>
-            <a:fillRef idx="1">
-              <a:schemeClr val="accent1"/>
-            </a:fillRef>
-            <a:effectRef idx="0">
-              <a:schemeClr val="accent1"/>
-            </a:effectRef>
-            <a:fontRef idx="minor">
-              <a:schemeClr val="lt1"/>
-            </a:fontRef>
-          </p:style>
-          <p:txBody>
-            <a:bodyPr rtlCol="0" anchor="ctr"/>
-            <a:lstStyle/>
-            <a:p>
-              <a:pPr algn="ctr"/>
-              <a:endParaRPr lang="fr-CA" dirty="0"/>
-            </a:p>
-          </p:txBody>
-        </p:sp>
-      </p:grpSp>
-      <p:sp>
-        <p:nvSpPr>
-          <p:cNvPr id="5" name="Rectangle 4">
-            <a:extLst>
-              <a:ext uri="{FF2B5EF4-FFF2-40B4-BE49-F238E27FC236}">
-                <a16:creationId xmlns:a16="http://schemas.microsoft.com/office/drawing/2014/main" id="{AC752894-3737-43BF-83F5-0EE98132B72A}"/>
-              </a:ext>
-            </a:extLst>
-          </p:cNvPr>
-          <p:cNvSpPr/>
-          <p:nvPr/>
-        </p:nvSpPr>
-        <p:spPr>
-          <a:xfrm>
-            <a:off x="838200" y="1636991"/>
-            <a:ext cx="3971925" cy="3693319"/>
-          </a:xfrm>
-          <a:prstGeom prst="rect">
-            <a:avLst/>
-          </a:prstGeom>
-        </p:spPr>
-        <p:txBody>
-          <a:bodyPr wrap="square">
-            <a:spAutoFit/>
-          </a:bodyPr>
-          <a:lstStyle/>
-          <a:p>
-            <a:r>
-              <a:rPr lang="fr-CA" dirty="0"/>
-              <a:t>Le </a:t>
-            </a:r>
-            <a:r>
-              <a:rPr lang="fr-CA" b="1" dirty="0"/>
-              <a:t>baud</a:t>
-            </a:r>
-            <a:r>
-              <a:rPr lang="fr-CA" dirty="0"/>
-              <a:t>, définit la vitesse de communication entre la carte et l’ordinateur. Plus le baud est rapide, plus on peut envoyer de messages. Par contre, plus il y a des erreurs potentielles. Pour l’Arduino Nano, une valeur de 57 600 est un bon compromis. </a:t>
-            </a:r>
-            <a:r>
-              <a:rPr lang="fr-CA" b="1" dirty="0"/>
-              <a:t>Le plus important est que l’ordinateur et la carte utilisent la même valeur!</a:t>
-            </a:r>
-          </a:p>
-          <a:p>
-            <a:endParaRPr lang="fr-CA" dirty="0"/>
-          </a:p>
-          <a:p>
-            <a:r>
-              <a:rPr lang="fr-CA" dirty="0"/>
-              <a:t>Valeurs de </a:t>
-            </a:r>
-            <a:r>
-              <a:rPr lang="fr-CA" b="1" dirty="0"/>
-              <a:t>baud</a:t>
-            </a:r>
-            <a:r>
-              <a:rPr lang="fr-CA" dirty="0"/>
-              <a:t> possibles : 300, 600, 1200, 2400, 4800, 9600, 14400, 19200, 28800, 38400, 57600, 115200 et +</a:t>
-            </a:r>
-          </a:p>
-        </p:txBody>
-      </p:sp>
-    </p:spTree>
-    <p:extLst>
-      <p:ext uri="{BB962C8B-B14F-4D97-AF65-F5344CB8AC3E}">
-        <p14:creationId xmlns:p14="http://schemas.microsoft.com/office/powerpoint/2010/main" val="943969791"/>
-      </p:ext>
-    </p:extLst>
-  </p:cSld>
-  <p:clrMapOvr>
-    <a:masterClrMapping/>
-  </p:clrMapOvr>
-</p:sld>
-</file>
-
-<file path=ppt/slides/slide6.xml><?xml version="1.0" encoding="utf-8"?>
-<p:sld xmlns:a="http://schemas.openxmlformats.org/drawingml/2006/main" xmlns:r="http://schemas.openxmlformats.org/officeDocument/2006/relationships" xmlns:p="http://schemas.openxmlformats.org/presentationml/2006/main">
-  <p:cSld>
-    <p:spTree>
-      <p:nvGrpSpPr>
-        <p:cNvPr id="1" name=""/>
-        <p:cNvGrpSpPr/>
-        <p:nvPr/>
-      </p:nvGrpSpPr>
-      <p:grpSpPr>
-        <a:xfrm>
-          <a:off x="0" y="0"/>
-          <a:ext cx="0" cy="0"/>
-          <a:chOff x="0" y="0"/>
-          <a:chExt cx="0" cy="0"/>
-        </a:xfrm>
-      </p:grpSpPr>
-      <p:sp>
-        <p:nvSpPr>
-          <p:cNvPr id="2" name="Titre 1">
-            <a:extLst>
-              <a:ext uri="{FF2B5EF4-FFF2-40B4-BE49-F238E27FC236}">
-                <a16:creationId xmlns:a16="http://schemas.microsoft.com/office/drawing/2014/main" id="{7005A587-273D-4A3C-859E-17AD32EABF34}"/>
-              </a:ext>
-            </a:extLst>
-          </p:cNvPr>
-          <p:cNvSpPr>
-            <a:spLocks noGrp="1"/>
-          </p:cNvSpPr>
-          <p:nvPr>
-            <p:ph type="title"/>
-          </p:nvPr>
-        </p:nvSpPr>
-        <p:spPr/>
-        <p:txBody>
-          <a:bodyPr>
-            <a:normAutofit/>
-          </a:bodyPr>
-          <a:lstStyle/>
-          <a:p>
-            <a:r>
-              <a:rPr lang="fr-CA" sz="2400" dirty="0"/>
-              <a:t>DÉBOGUER AVEC Serial</a:t>
+              <a:t>Retourne une seule donnée reçue (la plus ancienne et ensuite l’efface).</a:t>
             </a:r>
           </a:p>
         </p:txBody>
       </p:sp>
       <p:pic>
         <p:nvPicPr>
-          <p:cNvPr id="10" name="Image 9">
-            <a:extLst>
-              <a:ext uri="{FF2B5EF4-FFF2-40B4-BE49-F238E27FC236}">
-                <a16:creationId xmlns:a16="http://schemas.microsoft.com/office/drawing/2014/main" id="{DF124CC7-682C-49A6-A8B4-E595218AE8F8}"/>
-              </a:ext>
-            </a:extLst>
-          </p:cNvPr>
-          <p:cNvPicPr>
-            <a:picLocks noChangeAspect="1"/>
-          </p:cNvPicPr>
-          <p:nvPr/>
-        </p:nvPicPr>
-        <p:blipFill>
-          <a:blip r:embed="rId2"/>
-          <a:stretch>
-            <a:fillRect/>
-          </a:stretch>
-        </p:blipFill>
-        <p:spPr>
-          <a:xfrm>
-            <a:off x="1009650" y="1458785"/>
-            <a:ext cx="7097115" cy="390580"/>
-          </a:xfrm>
-          <a:prstGeom prst="rect">
-            <a:avLst/>
-          </a:prstGeom>
-        </p:spPr>
-      </p:pic>
-      <p:pic>
-        <p:nvPicPr>
-          <p:cNvPr id="24" name="Image 23">
-            <a:extLst>
-              <a:ext uri="{FF2B5EF4-FFF2-40B4-BE49-F238E27FC236}">
-                <a16:creationId xmlns:a16="http://schemas.microsoft.com/office/drawing/2014/main" id="{003CB199-AC20-4FAF-A153-4203C55FE78A}"/>
+          <p:cNvPr id="3" name="Image 2">
+            <a:extLst>
+              <a:ext uri="{FF2B5EF4-FFF2-40B4-BE49-F238E27FC236}">
+                <a16:creationId xmlns:a16="http://schemas.microsoft.com/office/drawing/2014/main" id="{D0AF15CA-9D19-4529-AA11-F297E226BF23}"/>
               </a:ext>
             </a:extLst>
           </p:cNvPr>
@@ -6906,8 +5994,8 @@
         </p:blipFill>
         <p:spPr>
           <a:xfrm>
-            <a:off x="1009650" y="3164091"/>
-            <a:ext cx="7182852" cy="390580"/>
+            <a:off x="933453" y="2273549"/>
+            <a:ext cx="3656354" cy="491791"/>
           </a:xfrm>
           <a:prstGeom prst="rect">
             <a:avLst/>
@@ -6916,10 +6004,10 @@
       </p:pic>
       <p:pic>
         <p:nvPicPr>
-          <p:cNvPr id="25" name="Image 24">
-            <a:extLst>
-              <a:ext uri="{FF2B5EF4-FFF2-40B4-BE49-F238E27FC236}">
-                <a16:creationId xmlns:a16="http://schemas.microsoft.com/office/drawing/2014/main" id="{62D5DF4F-EF92-401A-90F2-24BE3D4DA8E2}"/>
+          <p:cNvPr id="4" name="Image 3">
+            <a:extLst>
+              <a:ext uri="{FF2B5EF4-FFF2-40B4-BE49-F238E27FC236}">
+                <a16:creationId xmlns:a16="http://schemas.microsoft.com/office/drawing/2014/main" id="{4E72FCF2-F9E4-405C-B39C-E6AA1AC47726}"/>
               </a:ext>
             </a:extLst>
           </p:cNvPr>
@@ -6936,8 +6024,8 @@
         </p:blipFill>
         <p:spPr>
           <a:xfrm>
-            <a:off x="1009650" y="4729102"/>
-            <a:ext cx="7059010" cy="438211"/>
+            <a:off x="2494590" y="3224048"/>
+            <a:ext cx="3307367" cy="525826"/>
           </a:xfrm>
           <a:prstGeom prst="rect">
             <a:avLst/>
@@ -6946,10 +6034,10 @@
       </p:pic>
       <p:sp>
         <p:nvSpPr>
-          <p:cNvPr id="26" name="Rectangle 25">
-            <a:extLst>
-              <a:ext uri="{FF2B5EF4-FFF2-40B4-BE49-F238E27FC236}">
-                <a16:creationId xmlns:a16="http://schemas.microsoft.com/office/drawing/2014/main" id="{29ECBC2D-C9B2-4213-8668-EA4AD5A285FC}"/>
+          <p:cNvPr id="38" name="Rectangle 37">
+            <a:extLst>
+              <a:ext uri="{FF2B5EF4-FFF2-40B4-BE49-F238E27FC236}">
+                <a16:creationId xmlns:a16="http://schemas.microsoft.com/office/drawing/2014/main" id="{0A1A45C1-C6ED-473E-AEED-2129ED1CEA1F}"/>
               </a:ext>
             </a:extLst>
           </p:cNvPr>
@@ -6958,8 +6046,8 @@
         </p:nvSpPr>
         <p:spPr>
           <a:xfrm>
-            <a:off x="914398" y="2010908"/>
-            <a:ext cx="10648952" cy="646331"/>
+            <a:off x="838200" y="2716134"/>
+            <a:ext cx="10648952" cy="369332"/>
           </a:xfrm>
           <a:prstGeom prst="rect">
             <a:avLst/>
@@ -6972,85 +6060,77 @@
           <a:lstStyle/>
           <a:p>
             <a:r>
+              <a:rPr lang="fr-CA" dirty="0" err="1"/>
+              <a:t>Serial.available</a:t>
+            </a:r>
+            <a:r>
               <a:rPr lang="fr-CA" dirty="0"/>
-              <a:t>Cette fonction démarre la communication avec l’ordinateur. Les valeurs de </a:t>
-            </a:r>
-            <a:r>
-              <a:rPr lang="fr-CA" b="1" dirty="0"/>
-              <a:t>baud</a:t>
+              <a:t>() retourne </a:t>
+            </a:r>
+            <a:r>
+              <a:rPr lang="fr-CA" i="1" dirty="0"/>
+              <a:t>false</a:t>
             </a:r>
             <a:r>
               <a:rPr lang="fr-CA" dirty="0"/>
-              <a:t> possibles : 300, 600, 1200, 2400, 4800, 9600, 14400, 19200, 28800, 38400, 57600, 115200 et +</a:t>
-            </a:r>
-          </a:p>
-        </p:txBody>
-      </p:sp>
-      <p:sp>
-        <p:nvSpPr>
-          <p:cNvPr id="35" name="Rectangle 34">
-            <a:extLst>
-              <a:ext uri="{FF2B5EF4-FFF2-40B4-BE49-F238E27FC236}">
-                <a16:creationId xmlns:a16="http://schemas.microsoft.com/office/drawing/2014/main" id="{AF0DD6E8-5FEA-4243-9569-9BE01B461D59}"/>
-              </a:ext>
-            </a:extLst>
-          </p:cNvPr>
-          <p:cNvSpPr/>
+              <a:t> s’il n’y a pas de données ou </a:t>
+            </a:r>
+            <a:r>
+              <a:rPr lang="fr-CA" i="1" dirty="0" err="1"/>
+              <a:t>true</a:t>
+            </a:r>
+            <a:r>
+              <a:rPr lang="fr-CA" i="1" dirty="0"/>
+              <a:t> </a:t>
+            </a:r>
+            <a:r>
+              <a:rPr lang="fr-CA" dirty="0"/>
+              <a:t>s’il y en a. </a:t>
+            </a:r>
+          </a:p>
+        </p:txBody>
+      </p:sp>
+      <p:pic>
+        <p:nvPicPr>
+          <p:cNvPr id="6" name="Image 5">
+            <a:extLst>
+              <a:ext uri="{FF2B5EF4-FFF2-40B4-BE49-F238E27FC236}">
+                <a16:creationId xmlns:a16="http://schemas.microsoft.com/office/drawing/2014/main" id="{2CDC7048-0BE0-4C1D-A9D0-28F2E87B09B8}"/>
+              </a:ext>
+            </a:extLst>
+          </p:cNvPr>
+          <p:cNvPicPr>
+            <a:picLocks noChangeAspect="1"/>
+          </p:cNvPicPr>
           <p:nvPr/>
-        </p:nvSpPr>
-        <p:spPr>
-          <a:xfrm>
-            <a:off x="4601076" y="1414344"/>
-            <a:ext cx="2094115" cy="471482"/>
+        </p:nvPicPr>
+        <p:blipFill>
+          <a:blip r:embed="rId5"/>
+          <a:stretch>
+            <a:fillRect/>
+          </a:stretch>
+        </p:blipFill>
+        <p:spPr>
+          <a:xfrm>
+            <a:off x="4956560" y="4596861"/>
+            <a:ext cx="6180356" cy="1806097"/>
           </a:xfrm>
           <a:prstGeom prst="rect">
             <a:avLst/>
           </a:prstGeom>
-          <a:solidFill>
-            <a:schemeClr val="accent3"/>
-          </a:solidFill>
           <a:ln>
-            <a:noFill/>
+            <a:solidFill>
+              <a:schemeClr val="accent6"/>
+            </a:solidFill>
           </a:ln>
         </p:spPr>
-        <p:style>
-          <a:lnRef idx="2">
-            <a:schemeClr val="accent1">
-              <a:shade val="50000"/>
-            </a:schemeClr>
-          </a:lnRef>
-          <a:fillRef idx="1">
-            <a:schemeClr val="accent1"/>
-          </a:fillRef>
-          <a:effectRef idx="0">
-            <a:schemeClr val="accent1"/>
-          </a:effectRef>
-          <a:fontRef idx="minor">
-            <a:schemeClr val="lt1"/>
-          </a:fontRef>
-        </p:style>
-        <p:txBody>
-          <a:bodyPr rtlCol="0" anchor="ctr"/>
-          <a:lstStyle/>
-          <a:p>
-            <a:pPr algn="ctr"/>
-            <a:r>
-              <a:rPr lang="fr-CA" sz="3200" dirty="0">
-                <a:solidFill>
-                  <a:schemeClr val="tx1"/>
-                </a:solidFill>
-              </a:rPr>
-              <a:t>baud</a:t>
-            </a:r>
-          </a:p>
-        </p:txBody>
-      </p:sp>
-      <p:sp>
-        <p:nvSpPr>
-          <p:cNvPr id="36" name="Rectangle 35">
-            <a:extLst>
-              <a:ext uri="{FF2B5EF4-FFF2-40B4-BE49-F238E27FC236}">
-                <a16:creationId xmlns:a16="http://schemas.microsoft.com/office/drawing/2014/main" id="{DCCE8C16-28D1-4898-B717-4D329F5F176B}"/>
+      </p:pic>
+      <p:sp>
+        <p:nvSpPr>
+          <p:cNvPr id="16" name="Rectangle 15">
+            <a:extLst>
+              <a:ext uri="{FF2B5EF4-FFF2-40B4-BE49-F238E27FC236}">
+                <a16:creationId xmlns:a16="http://schemas.microsoft.com/office/drawing/2014/main" id="{F1C7FFE2-1359-40A8-B565-1EFBD0361C29}"/>
               </a:ext>
             </a:extLst>
           </p:cNvPr>
@@ -7059,130 +6139,12 @@
         </p:nvSpPr>
         <p:spPr>
           <a:xfrm>
-            <a:off x="3706418" y="3083189"/>
-            <a:ext cx="3961207" cy="471482"/>
+            <a:off x="933452" y="4914432"/>
+            <a:ext cx="4023108" cy="923330"/>
           </a:xfrm>
           <a:prstGeom prst="rect">
             <a:avLst/>
           </a:prstGeom>
-          <a:solidFill>
-            <a:schemeClr val="accent3"/>
-          </a:solidFill>
-          <a:ln>
-            <a:noFill/>
-          </a:ln>
-        </p:spPr>
-        <p:style>
-          <a:lnRef idx="2">
-            <a:schemeClr val="accent1">
-              <a:shade val="50000"/>
-            </a:schemeClr>
-          </a:lnRef>
-          <a:fillRef idx="1">
-            <a:schemeClr val="accent1"/>
-          </a:fillRef>
-          <a:effectRef idx="0">
-            <a:schemeClr val="accent1"/>
-          </a:effectRef>
-          <a:fontRef idx="minor">
-            <a:schemeClr val="lt1"/>
-          </a:fontRef>
-        </p:style>
-        <p:txBody>
-          <a:bodyPr rtlCol="0" anchor="ctr"/>
-          <a:lstStyle/>
-          <a:p>
-            <a:pPr algn="ctr"/>
-            <a:r>
-              <a:rPr lang="fr-CA" sz="3200" dirty="0">
-                <a:solidFill>
-                  <a:schemeClr val="tx1"/>
-                </a:solidFill>
-              </a:rPr>
-              <a:t>valeur à envoyer</a:t>
-            </a:r>
-          </a:p>
-        </p:txBody>
-      </p:sp>
-      <p:sp>
-        <p:nvSpPr>
-          <p:cNvPr id="37" name="Rectangle 36">
-            <a:extLst>
-              <a:ext uri="{FF2B5EF4-FFF2-40B4-BE49-F238E27FC236}">
-                <a16:creationId xmlns:a16="http://schemas.microsoft.com/office/drawing/2014/main" id="{1E8A71B8-65DF-4B08-B832-78DB03D591F3}"/>
-              </a:ext>
-            </a:extLst>
-          </p:cNvPr>
-          <p:cNvSpPr/>
-          <p:nvPr/>
-        </p:nvSpPr>
-        <p:spPr>
-          <a:xfrm>
-            <a:off x="4211243" y="4695831"/>
-            <a:ext cx="3456382" cy="471482"/>
-          </a:xfrm>
-          <a:prstGeom prst="rect">
-            <a:avLst/>
-          </a:prstGeom>
-          <a:solidFill>
-            <a:schemeClr val="accent3"/>
-          </a:solidFill>
-          <a:ln>
-            <a:noFill/>
-          </a:ln>
-        </p:spPr>
-        <p:style>
-          <a:lnRef idx="2">
-            <a:schemeClr val="accent1">
-              <a:shade val="50000"/>
-            </a:schemeClr>
-          </a:lnRef>
-          <a:fillRef idx="1">
-            <a:schemeClr val="accent1"/>
-          </a:fillRef>
-          <a:effectRef idx="0">
-            <a:schemeClr val="accent1"/>
-          </a:effectRef>
-          <a:fontRef idx="minor">
-            <a:schemeClr val="lt1"/>
-          </a:fontRef>
-        </p:style>
-        <p:txBody>
-          <a:bodyPr rtlCol="0" anchor="ctr"/>
-          <a:lstStyle/>
-          <a:p>
-            <a:pPr algn="ctr"/>
-            <a:r>
-              <a:rPr lang="fr-CA" sz="3200" dirty="0">
-                <a:solidFill>
-                  <a:schemeClr val="tx1"/>
-                </a:solidFill>
-              </a:rPr>
-              <a:t>valeur à imprimer</a:t>
-            </a:r>
-          </a:p>
-        </p:txBody>
-      </p:sp>
-      <p:sp>
-        <p:nvSpPr>
-          <p:cNvPr id="38" name="Rectangle 37">
-            <a:extLst>
-              <a:ext uri="{FF2B5EF4-FFF2-40B4-BE49-F238E27FC236}">
-                <a16:creationId xmlns:a16="http://schemas.microsoft.com/office/drawing/2014/main" id="{0A1A45C1-C6ED-473E-AEED-2129ED1CEA1F}"/>
-              </a:ext>
-            </a:extLst>
-          </p:cNvPr>
-          <p:cNvSpPr/>
-          <p:nvPr/>
-        </p:nvSpPr>
-        <p:spPr>
-          <a:xfrm>
-            <a:off x="914398" y="3625662"/>
-            <a:ext cx="10648952" cy="369332"/>
-          </a:xfrm>
-          <a:prstGeom prst="rect">
-            <a:avLst/>
-          </a:prstGeom>
         </p:spPr>
         <p:txBody>
           <a:bodyPr wrap="square">
@@ -7190,43 +6152,10 @@
           </a:bodyPr>
           <a:lstStyle/>
           <a:p>
+            <a:pPr algn="r"/>
             <a:r>
               <a:rPr lang="fr-CA" dirty="0"/>
-              <a:t>Envoie à l’ordinateur une valeur en mode texte.</a:t>
-            </a:r>
-          </a:p>
-        </p:txBody>
-      </p:sp>
-      <p:sp>
-        <p:nvSpPr>
-          <p:cNvPr id="39" name="Rectangle 38">
-            <a:extLst>
-              <a:ext uri="{FF2B5EF4-FFF2-40B4-BE49-F238E27FC236}">
-                <a16:creationId xmlns:a16="http://schemas.microsoft.com/office/drawing/2014/main" id="{AD5C3158-B106-4F9A-9755-3024C2CF7630}"/>
-              </a:ext>
-            </a:extLst>
-          </p:cNvPr>
-          <p:cNvSpPr/>
-          <p:nvPr/>
-        </p:nvSpPr>
-        <p:spPr>
-          <a:xfrm>
-            <a:off x="914398" y="5161807"/>
-            <a:ext cx="10648952" cy="369332"/>
-          </a:xfrm>
-          <a:prstGeom prst="rect">
-            <a:avLst/>
-          </a:prstGeom>
-        </p:spPr>
-        <p:txBody>
-          <a:bodyPr wrap="square">
-            <a:spAutoFit/>
-          </a:bodyPr>
-          <a:lstStyle/>
-          <a:p>
-            <a:r>
-              <a:rPr lang="fr-CA" dirty="0"/>
-              <a:t>Envoie à l’ordinateur une valeur en mode texte, suivi d’un retour à la ligne (ln).</a:t>
+              <a:t>Nous utilisons habituellement ce block de code pour faire la lecture des données, une par une à mesure qu’elles sont reçues.</a:t>
             </a:r>
           </a:p>
         </p:txBody>
@@ -7234,7 +6163,7 @@
     </p:spTree>
     <p:extLst>
       <p:ext uri="{BB962C8B-B14F-4D97-AF65-F5344CB8AC3E}">
-        <p14:creationId xmlns:p14="http://schemas.microsoft.com/office/powerpoint/2010/main" val="3577930283"/>
+        <p14:creationId xmlns:p14="http://schemas.microsoft.com/office/powerpoint/2010/main" val="3839448070"/>
       </p:ext>
     </p:extLst>
   </p:cSld>

</xml_diff>